<commit_message>
flexbox folien neu Aufgabe
</commit_message>
<xml_diff>
--- a/4. Flexbox&Grid/Flexbox&Grid.pptx
+++ b/4. Flexbox&Grid/Flexbox&Grid.pptx
@@ -20,23 +20,24 @@
     <p:sldId id="355" r:id="rId14"/>
     <p:sldId id="356" r:id="rId15"/>
     <p:sldId id="366" r:id="rId16"/>
-    <p:sldId id="375" r:id="rId17"/>
-    <p:sldId id="357" r:id="rId18"/>
-    <p:sldId id="358" r:id="rId19"/>
-    <p:sldId id="359" r:id="rId20"/>
-    <p:sldId id="360" r:id="rId21"/>
-    <p:sldId id="361" r:id="rId22"/>
-    <p:sldId id="362" r:id="rId23"/>
-    <p:sldId id="374" r:id="rId24"/>
-    <p:sldId id="365" r:id="rId25"/>
-    <p:sldId id="331" r:id="rId26"/>
-    <p:sldId id="367" r:id="rId27"/>
-    <p:sldId id="368" r:id="rId28"/>
-    <p:sldId id="369" r:id="rId29"/>
-    <p:sldId id="371" r:id="rId30"/>
-    <p:sldId id="372" r:id="rId31"/>
-    <p:sldId id="373" r:id="rId32"/>
-    <p:sldId id="292" r:id="rId33"/>
+    <p:sldId id="376" r:id="rId17"/>
+    <p:sldId id="375" r:id="rId18"/>
+    <p:sldId id="357" r:id="rId19"/>
+    <p:sldId id="358" r:id="rId20"/>
+    <p:sldId id="359" r:id="rId21"/>
+    <p:sldId id="360" r:id="rId22"/>
+    <p:sldId id="361" r:id="rId23"/>
+    <p:sldId id="362" r:id="rId24"/>
+    <p:sldId id="374" r:id="rId25"/>
+    <p:sldId id="365" r:id="rId26"/>
+    <p:sldId id="331" r:id="rId27"/>
+    <p:sldId id="367" r:id="rId28"/>
+    <p:sldId id="368" r:id="rId29"/>
+    <p:sldId id="369" r:id="rId30"/>
+    <p:sldId id="371" r:id="rId31"/>
+    <p:sldId id="372" r:id="rId32"/>
+    <p:sldId id="373" r:id="rId33"/>
+    <p:sldId id="292" r:id="rId34"/>
   </p:sldIdLst>
   <p:sldSz cx="12192000" cy="6858000"/>
   <p:notesSz cx="6858000" cy="9144000"/>
@@ -3503,7 +3504,7 @@
                 <a16:creationId xmlns:a16="http://schemas.microsoft.com/office/drawing/2014/main" id="{BE229233-9672-4675-99B7-6CBCEF1CD415}"/>
               </a:ext>
               <a:ext uri="{C183D7F6-B498-43B3-948B-1728B52AA6E4}">
-                <adec:decorative xmlns:adec="http://schemas.microsoft.com/office/drawing/2017/decorative" val="1"/>
+                <adec:decorative xmlns:adec="http://schemas.microsoft.com/office/drawing/2017/decorative" xmlns="" val="1"/>
               </a:ext>
             </a:extLst>
           </p:cNvPr>
@@ -3598,7 +3599,7 @@
                 <a16:creationId xmlns:a16="http://schemas.microsoft.com/office/drawing/2014/main" id="{EC5FF010-B53C-46BE-BEEF-AF926A00F67F}"/>
               </a:ext>
               <a:ext uri="{C183D7F6-B498-43B3-948B-1728B52AA6E4}">
-                <adec:decorative xmlns:adec="http://schemas.microsoft.com/office/drawing/2017/decorative" val="1"/>
+                <adec:decorative xmlns:adec="http://schemas.microsoft.com/office/drawing/2017/decorative" xmlns="" val="1"/>
               </a:ext>
             </a:extLst>
           </p:cNvPr>
@@ -3664,7 +3665,7 @@
                 <a16:creationId xmlns:a16="http://schemas.microsoft.com/office/drawing/2014/main" id="{8509AD9C-1F43-4138-A72B-8CA988EDD475}"/>
               </a:ext>
               <a:ext uri="{C183D7F6-B498-43B3-948B-1728B52AA6E4}">
-                <adec:decorative xmlns:adec="http://schemas.microsoft.com/office/drawing/2017/decorative" val="1"/>
+                <adec:decorative xmlns:adec="http://schemas.microsoft.com/office/drawing/2017/decorative" xmlns="" val="1"/>
               </a:ext>
             </a:extLst>
           </p:cNvPr>
@@ -5511,6 +5512,10 @@
               <a:rPr lang="de-AT" sz="1900" dirty="0"/>
               <a:t>-reverse" gesetzt ist. In einzeiligen Containern hat sie keine Wirkung</a:t>
             </a:r>
+            <a:r>
+              <a:rPr lang="de-AT" sz="1600" dirty="0"/>
+              <a:t/>
+            </a:r>
             <a:br>
               <a:rPr lang="de-AT" sz="1600" dirty="0"/>
             </a:br>
@@ -6793,7 +6798,11 @@
             </a:r>
             <a:r>
               <a:rPr lang="de-AT" dirty="0"/>
-              <a:t>: Übung</a:t>
+              <a:t>: </a:t>
+            </a:r>
+            <a:r>
+              <a:rPr lang="de-AT" dirty="0" smtClean="0"/>
+              <a:t>Übung 1</a:t>
             </a:r>
             <a:endParaRPr lang="en-US" dirty="0"/>
           </a:p>
@@ -6823,6 +6832,433 @@
           <a:p>
             <a:r>
               <a:rPr lang="de-AT" dirty="0"/>
+              <a:t>Schreibe CSS Code um </a:t>
+            </a:r>
+            <a:r>
+              <a:rPr lang="de-AT" dirty="0" smtClean="0"/>
+              <a:t>das Bild nebenan zu </a:t>
+            </a:r>
+            <a:r>
+              <a:rPr lang="de-AT" dirty="0"/>
+              <a:t>erzeugen. Nutze dafür dein Wissen über </a:t>
+            </a:r>
+            <a:r>
+              <a:rPr lang="de-AT" dirty="0" err="1"/>
+              <a:t>flexbox</a:t>
+            </a:r>
+            <a:r>
+              <a:rPr lang="de-AT" dirty="0"/>
+              <a:t/>
+            </a:r>
+            <a:br>
+              <a:rPr lang="de-AT" dirty="0"/>
+            </a:br>
+            <a:r>
+              <a:rPr lang="de-AT" dirty="0"/>
+              <a:t>Ressourcen: /</a:t>
+            </a:r>
+            <a:r>
+              <a:rPr lang="de-AT" dirty="0" err="1" smtClean="0"/>
+              <a:t>Flexbox&amp;Grid</a:t>
+            </a:r>
+            <a:r>
+              <a:rPr lang="de-AT" dirty="0" smtClean="0"/>
+              <a:t>/flexbox.html</a:t>
+            </a:r>
+            <a:endParaRPr lang="de-AT" dirty="0"/>
+          </a:p>
+          <a:p>
+            <a:r>
+              <a:rPr lang="de-AT" dirty="0"/>
+              <a:t>Die Elemente </a:t>
+            </a:r>
+            <a:r>
+              <a:rPr lang="de-AT" dirty="0" smtClean="0"/>
+              <a:t>sollen </a:t>
+            </a:r>
+            <a:r>
+              <a:rPr lang="de-AT" dirty="0"/>
+              <a:t>bei Bildschirmbreite größer als </a:t>
+            </a:r>
+            <a:r>
+              <a:rPr lang="de-AT" dirty="0" smtClean="0"/>
+              <a:t>600px nebeneinander mit gleichem Abstand bei </a:t>
+            </a:r>
+            <a:r>
+              <a:rPr lang="de-AT" dirty="0"/>
+              <a:t>weniger untereinander zentriert angeordnet werden</a:t>
+            </a:r>
+          </a:p>
+          <a:p>
+            <a:r>
+              <a:rPr lang="de-AT" dirty="0"/>
+              <a:t>Die Buttons sollen beim drüber </a:t>
+            </a:r>
+            <a:r>
+              <a:rPr lang="de-AT" dirty="0" err="1"/>
+              <a:t>hovern</a:t>
+            </a:r>
+            <a:r>
+              <a:rPr lang="de-AT" dirty="0"/>
+              <a:t> eine andere Farbe annehmen</a:t>
+            </a:r>
+            <a:endParaRPr lang="de-DE" dirty="0"/>
+          </a:p>
+        </p:txBody>
+      </p:sp>
+      <p:pic>
+        <p:nvPicPr>
+          <p:cNvPr id="4" name="Grafik 3"/>
+          <p:cNvPicPr>
+            <a:picLocks noChangeAspect="1"/>
+          </p:cNvPicPr>
+          <p:nvPr/>
+        </p:nvPicPr>
+        <p:blipFill>
+          <a:blip r:embed="rId2"/>
+          <a:stretch>
+            <a:fillRect/>
+          </a:stretch>
+        </p:blipFill>
+        <p:spPr>
+          <a:xfrm>
+            <a:off x="9059973" y="2057400"/>
+            <a:ext cx="1914792" cy="2772162"/>
+          </a:xfrm>
+          <a:prstGeom prst="rect">
+            <a:avLst/>
+          </a:prstGeom>
+        </p:spPr>
+      </p:pic>
+      <p:pic>
+        <p:nvPicPr>
+          <p:cNvPr id="5" name="Grafik 4"/>
+          <p:cNvPicPr>
+            <a:picLocks noChangeAspect="1"/>
+          </p:cNvPicPr>
+          <p:nvPr/>
+        </p:nvPicPr>
+        <p:blipFill>
+          <a:blip r:embed="rId3"/>
+          <a:stretch>
+            <a:fillRect/>
+          </a:stretch>
+        </p:blipFill>
+        <p:spPr>
+          <a:xfrm>
+            <a:off x="585054" y="5017110"/>
+            <a:ext cx="10582275" cy="1571625"/>
+          </a:xfrm>
+          <a:prstGeom prst="rect">
+            <a:avLst/>
+          </a:prstGeom>
+        </p:spPr>
+      </p:pic>
+    </p:spTree>
+    <p:extLst>
+      <p:ext uri="{BB962C8B-B14F-4D97-AF65-F5344CB8AC3E}">
+        <p14:creationId xmlns:p14="http://schemas.microsoft.com/office/powerpoint/2010/main" val="3077107171"/>
+      </p:ext>
+    </p:extLst>
+  </p:cSld>
+  <p:clrMapOvr>
+    <a:masterClrMapping/>
+  </p:clrMapOvr>
+  <p:timing>
+    <p:tnLst>
+      <p:par>
+        <p:cTn id="1" dur="indefinite" restart="never" nodeType="tmRoot">
+          <p:childTnLst>
+            <p:seq concurrent="1" nextAc="seek">
+              <p:cTn id="2" dur="indefinite" nodeType="mainSeq">
+                <p:childTnLst>
+                  <p:par>
+                    <p:cTn id="3" fill="hold">
+                      <p:stCondLst>
+                        <p:cond delay="indefinite"/>
+                      </p:stCondLst>
+                      <p:childTnLst>
+                        <p:par>
+                          <p:cTn id="4" fill="hold">
+                            <p:stCondLst>
+                              <p:cond delay="0"/>
+                            </p:stCondLst>
+                            <p:childTnLst>
+                              <p:par>
+                                <p:cTn id="5" presetID="10" presetClass="entr" presetSubtype="0" fill="hold" grpId="0" nodeType="clickEffect">
+                                  <p:stCondLst>
+                                    <p:cond delay="0"/>
+                                  </p:stCondLst>
+                                  <p:childTnLst>
+                                    <p:set>
+                                      <p:cBhvr>
+                                        <p:cTn id="6" dur="1" fill="hold">
+                                          <p:stCondLst>
+                                            <p:cond delay="0"/>
+                                          </p:stCondLst>
+                                        </p:cTn>
+                                        <p:tgtEl>
+                                          <p:spTgt spid="3">
+                                            <p:txEl>
+                                              <p:pRg st="0" end="0"/>
+                                            </p:txEl>
+                                          </p:spTgt>
+                                        </p:tgtEl>
+                                        <p:attrNameLst>
+                                          <p:attrName>style.visibility</p:attrName>
+                                        </p:attrNameLst>
+                                      </p:cBhvr>
+                                      <p:to>
+                                        <p:strVal val="visible"/>
+                                      </p:to>
+                                    </p:set>
+                                    <p:animEffect transition="in" filter="fade">
+                                      <p:cBhvr>
+                                        <p:cTn id="7" dur="500"/>
+                                        <p:tgtEl>
+                                          <p:spTgt spid="3">
+                                            <p:txEl>
+                                              <p:pRg st="0" end="0"/>
+                                            </p:txEl>
+                                          </p:spTgt>
+                                        </p:tgtEl>
+                                      </p:cBhvr>
+                                    </p:animEffect>
+                                  </p:childTnLst>
+                                </p:cTn>
+                              </p:par>
+                            </p:childTnLst>
+                          </p:cTn>
+                        </p:par>
+                      </p:childTnLst>
+                    </p:cTn>
+                  </p:par>
+                  <p:par>
+                    <p:cTn id="8" fill="hold">
+                      <p:stCondLst>
+                        <p:cond delay="indefinite"/>
+                      </p:stCondLst>
+                      <p:childTnLst>
+                        <p:par>
+                          <p:cTn id="9" fill="hold">
+                            <p:stCondLst>
+                              <p:cond delay="0"/>
+                            </p:stCondLst>
+                            <p:childTnLst>
+                              <p:par>
+                                <p:cTn id="10" presetID="10" presetClass="entr" presetSubtype="0" fill="hold" grpId="0" nodeType="clickEffect">
+                                  <p:stCondLst>
+                                    <p:cond delay="0"/>
+                                  </p:stCondLst>
+                                  <p:childTnLst>
+                                    <p:set>
+                                      <p:cBhvr>
+                                        <p:cTn id="11" dur="1" fill="hold">
+                                          <p:stCondLst>
+                                            <p:cond delay="0"/>
+                                          </p:stCondLst>
+                                        </p:cTn>
+                                        <p:tgtEl>
+                                          <p:spTgt spid="3">
+                                            <p:txEl>
+                                              <p:pRg st="1" end="1"/>
+                                            </p:txEl>
+                                          </p:spTgt>
+                                        </p:tgtEl>
+                                        <p:attrNameLst>
+                                          <p:attrName>style.visibility</p:attrName>
+                                        </p:attrNameLst>
+                                      </p:cBhvr>
+                                      <p:to>
+                                        <p:strVal val="visible"/>
+                                      </p:to>
+                                    </p:set>
+                                    <p:animEffect transition="in" filter="fade">
+                                      <p:cBhvr>
+                                        <p:cTn id="12" dur="500"/>
+                                        <p:tgtEl>
+                                          <p:spTgt spid="3">
+                                            <p:txEl>
+                                              <p:pRg st="1" end="1"/>
+                                            </p:txEl>
+                                          </p:spTgt>
+                                        </p:tgtEl>
+                                      </p:cBhvr>
+                                    </p:animEffect>
+                                  </p:childTnLst>
+                                </p:cTn>
+                              </p:par>
+                            </p:childTnLst>
+                          </p:cTn>
+                        </p:par>
+                      </p:childTnLst>
+                    </p:cTn>
+                  </p:par>
+                  <p:par>
+                    <p:cTn id="13" fill="hold">
+                      <p:stCondLst>
+                        <p:cond delay="indefinite"/>
+                      </p:stCondLst>
+                      <p:childTnLst>
+                        <p:par>
+                          <p:cTn id="14" fill="hold">
+                            <p:stCondLst>
+                              <p:cond delay="0"/>
+                            </p:stCondLst>
+                            <p:childTnLst>
+                              <p:par>
+                                <p:cTn id="15" presetID="10" presetClass="entr" presetSubtype="0" fill="hold" grpId="0" nodeType="clickEffect">
+                                  <p:stCondLst>
+                                    <p:cond delay="0"/>
+                                  </p:stCondLst>
+                                  <p:childTnLst>
+                                    <p:set>
+                                      <p:cBhvr>
+                                        <p:cTn id="16" dur="1" fill="hold">
+                                          <p:stCondLst>
+                                            <p:cond delay="0"/>
+                                          </p:stCondLst>
+                                        </p:cTn>
+                                        <p:tgtEl>
+                                          <p:spTgt spid="3">
+                                            <p:txEl>
+                                              <p:pRg st="2" end="2"/>
+                                            </p:txEl>
+                                          </p:spTgt>
+                                        </p:tgtEl>
+                                        <p:attrNameLst>
+                                          <p:attrName>style.visibility</p:attrName>
+                                        </p:attrNameLst>
+                                      </p:cBhvr>
+                                      <p:to>
+                                        <p:strVal val="visible"/>
+                                      </p:to>
+                                    </p:set>
+                                    <p:animEffect transition="in" filter="fade">
+                                      <p:cBhvr>
+                                        <p:cTn id="17" dur="500"/>
+                                        <p:tgtEl>
+                                          <p:spTgt spid="3">
+                                            <p:txEl>
+                                              <p:pRg st="2" end="2"/>
+                                            </p:txEl>
+                                          </p:spTgt>
+                                        </p:tgtEl>
+                                      </p:cBhvr>
+                                    </p:animEffect>
+                                  </p:childTnLst>
+                                </p:cTn>
+                              </p:par>
+                            </p:childTnLst>
+                          </p:cTn>
+                        </p:par>
+                      </p:childTnLst>
+                    </p:cTn>
+                  </p:par>
+                </p:childTnLst>
+              </p:cTn>
+              <p:prevCondLst>
+                <p:cond evt="onPrev" delay="0">
+                  <p:tgtEl>
+                    <p:sldTgt/>
+                  </p:tgtEl>
+                </p:cond>
+              </p:prevCondLst>
+              <p:nextCondLst>
+                <p:cond evt="onNext" delay="0">
+                  <p:tgtEl>
+                    <p:sldTgt/>
+                  </p:tgtEl>
+                </p:cond>
+              </p:nextCondLst>
+            </p:seq>
+          </p:childTnLst>
+        </p:cTn>
+      </p:par>
+    </p:tnLst>
+    <p:bldLst>
+      <p:bldP spid="3" grpId="0" build="p"/>
+    </p:bldLst>
+  </p:timing>
+</p:sld>
+</file>
+
+<file path=ppt/slides/slide17.xml><?xml version="1.0" encoding="utf-8"?>
+<p:sld xmlns:a="http://schemas.openxmlformats.org/drawingml/2006/main" xmlns:r="http://schemas.openxmlformats.org/officeDocument/2006/relationships" xmlns:p="http://schemas.openxmlformats.org/presentationml/2006/main">
+  <p:cSld>
+    <p:spTree>
+      <p:nvGrpSpPr>
+        <p:cNvPr id="1" name=""/>
+        <p:cNvGrpSpPr/>
+        <p:nvPr/>
+      </p:nvGrpSpPr>
+      <p:grpSpPr>
+        <a:xfrm>
+          <a:off x="0" y="0"/>
+          <a:ext cx="0" cy="0"/>
+          <a:chOff x="0" y="0"/>
+          <a:chExt cx="0" cy="0"/>
+        </a:xfrm>
+      </p:grpSpPr>
+      <p:sp>
+        <p:nvSpPr>
+          <p:cNvPr id="2" name="Titel 1"/>
+          <p:cNvSpPr>
+            <a:spLocks noGrp="1"/>
+          </p:cNvSpPr>
+          <p:nvPr>
+            <p:ph type="title"/>
+          </p:nvPr>
+        </p:nvSpPr>
+        <p:spPr/>
+        <p:txBody>
+          <a:bodyPr/>
+          <a:lstStyle/>
+          <a:p>
+            <a:r>
+              <a:rPr lang="de-AT" dirty="0"/>
+              <a:t>CSS </a:t>
+            </a:r>
+            <a:r>
+              <a:rPr lang="de-AT" dirty="0" err="1"/>
+              <a:t>Flexbox</a:t>
+            </a:r>
+            <a:r>
+              <a:rPr lang="de-AT" dirty="0"/>
+              <a:t>: </a:t>
+            </a:r>
+            <a:r>
+              <a:rPr lang="de-AT" dirty="0" smtClean="0"/>
+              <a:t>Übung 2</a:t>
+            </a:r>
+            <a:endParaRPr lang="en-US" dirty="0"/>
+          </a:p>
+        </p:txBody>
+      </p:sp>
+      <p:sp>
+        <p:nvSpPr>
+          <p:cNvPr id="3" name="Inhaltsplatzhalter 2"/>
+          <p:cNvSpPr>
+            <a:spLocks noGrp="1"/>
+          </p:cNvSpPr>
+          <p:nvPr>
+            <p:ph idx="1"/>
+          </p:nvPr>
+        </p:nvSpPr>
+        <p:spPr>
+          <a:xfrm>
+            <a:off x="495300" y="1760572"/>
+            <a:ext cx="6929628" cy="4137259"/>
+          </a:xfrm>
+        </p:spPr>
+        <p:txBody>
+          <a:bodyPr>
+            <a:normAutofit/>
+          </a:bodyPr>
+          <a:lstStyle/>
+          <a:p>
+            <a:r>
+              <a:rPr lang="de-AT" dirty="0"/>
               <a:t>Schreibe CSS Code um eine </a:t>
             </a:r>
             <a:r>
@@ -6836,6 +7272,10 @@
             <a:r>
               <a:rPr lang="de-AT" dirty="0" err="1"/>
               <a:t>flexbox</a:t>
+            </a:r>
+            <a:r>
+              <a:rPr lang="de-AT" dirty="0"/>
+              <a:t/>
             </a:r>
             <a:br>
               <a:rPr lang="de-AT" dirty="0"/>
@@ -7173,7 +7613,7 @@
 </p:sld>
 </file>
 
-<file path=ppt/slides/slide17.xml><?xml version="1.0" encoding="utf-8"?>
+<file path=ppt/slides/slide18.xml><?xml version="1.0" encoding="utf-8"?>
 <p:sld xmlns:a="http://schemas.openxmlformats.org/drawingml/2006/main" xmlns:r="http://schemas.openxmlformats.org/officeDocument/2006/relationships" xmlns:p="http://schemas.openxmlformats.org/presentationml/2006/main">
   <p:cSld>
     <p:spTree>
@@ -7497,7 +7937,7 @@
 </p:sld>
 </file>
 
-<file path=ppt/slides/slide18.xml><?xml version="1.0" encoding="utf-8"?>
+<file path=ppt/slides/slide19.xml><?xml version="1.0" encoding="utf-8"?>
 <p:sld xmlns:a="http://schemas.openxmlformats.org/drawingml/2006/main" xmlns:r="http://schemas.openxmlformats.org/officeDocument/2006/relationships" xmlns:p="http://schemas.openxmlformats.org/presentationml/2006/main">
   <p:cSld>
     <p:spTree>
@@ -7971,7 +8411,238 @@
 </p:sld>
 </file>
 
-<file path=ppt/slides/slide19.xml><?xml version="1.0" encoding="utf-8"?>
+<file path=ppt/slides/slide2.xml><?xml version="1.0" encoding="utf-8"?>
+<p:sld xmlns:a="http://schemas.openxmlformats.org/drawingml/2006/main" xmlns:r="http://schemas.openxmlformats.org/officeDocument/2006/relationships" xmlns:p="http://schemas.openxmlformats.org/presentationml/2006/main">
+  <p:cSld>
+    <p:spTree>
+      <p:nvGrpSpPr>
+        <p:cNvPr id="1" name=""/>
+        <p:cNvGrpSpPr/>
+        <p:nvPr/>
+      </p:nvGrpSpPr>
+      <p:grpSpPr>
+        <a:xfrm>
+          <a:off x="0" y="0"/>
+          <a:ext cx="0" cy="0"/>
+          <a:chOff x="0" y="0"/>
+          <a:chExt cx="0" cy="0"/>
+        </a:xfrm>
+      </p:grpSpPr>
+      <p:sp>
+        <p:nvSpPr>
+          <p:cNvPr id="2" name="Titel 1"/>
+          <p:cNvSpPr>
+            <a:spLocks noGrp="1"/>
+          </p:cNvSpPr>
+          <p:nvPr>
+            <p:ph type="title"/>
+          </p:nvPr>
+        </p:nvSpPr>
+        <p:spPr/>
+        <p:txBody>
+          <a:bodyPr/>
+          <a:lstStyle/>
+          <a:p>
+            <a:r>
+              <a:rPr lang="de-AT" dirty="0"/>
+              <a:t>CSS </a:t>
+            </a:r>
+            <a:r>
+              <a:rPr lang="de-AT" dirty="0" err="1"/>
+              <a:t>Flexbox</a:t>
+            </a:r>
+            <a:r>
+              <a:rPr lang="de-AT" dirty="0"/>
+              <a:t> </a:t>
+            </a:r>
+            <a:r>
+              <a:rPr lang="de-AT" dirty="0" err="1"/>
+              <a:t>vs</a:t>
+            </a:r>
+            <a:r>
+              <a:rPr lang="de-AT" dirty="0"/>
+              <a:t> </a:t>
+            </a:r>
+            <a:r>
+              <a:rPr lang="de-AT" dirty="0" err="1"/>
+              <a:t>other</a:t>
+            </a:r>
+            <a:r>
+              <a:rPr lang="de-AT" dirty="0"/>
+              <a:t> Layouts</a:t>
+            </a:r>
+            <a:endParaRPr lang="en-US" dirty="0"/>
+          </a:p>
+        </p:txBody>
+      </p:sp>
+      <p:sp>
+        <p:nvSpPr>
+          <p:cNvPr id="3" name="Inhaltsplatzhalter 2"/>
+          <p:cNvSpPr>
+            <a:spLocks noGrp="1"/>
+          </p:cNvSpPr>
+          <p:nvPr>
+            <p:ph idx="1"/>
+          </p:nvPr>
+        </p:nvSpPr>
+        <p:spPr>
+          <a:xfrm>
+            <a:off x="1181100" y="1869653"/>
+            <a:ext cx="5729969" cy="4988347"/>
+          </a:xfrm>
+        </p:spPr>
+        <p:txBody>
+          <a:bodyPr>
+            <a:normAutofit/>
+          </a:bodyPr>
+          <a:lstStyle/>
+          <a:p>
+            <a:r>
+              <a:rPr lang="de-DE" dirty="0"/>
+              <a:t>Ressource: 3.CSS/Codebeispiele/Layout/</a:t>
+            </a:r>
+            <a:endParaRPr lang="en-US" dirty="0"/>
+          </a:p>
+        </p:txBody>
+      </p:sp>
+      <p:pic>
+        <p:nvPicPr>
+          <p:cNvPr id="5" name="Grafik 4">
+            <a:extLst>
+              <a:ext uri="{FF2B5EF4-FFF2-40B4-BE49-F238E27FC236}">
+                <a16:creationId xmlns:a16="http://schemas.microsoft.com/office/drawing/2014/main" id="{F9EDBB7D-5B47-58A4-77DE-954353DDB123}"/>
+              </a:ext>
+            </a:extLst>
+          </p:cNvPr>
+          <p:cNvPicPr>
+            <a:picLocks noChangeAspect="1"/>
+          </p:cNvPicPr>
+          <p:nvPr/>
+        </p:nvPicPr>
+        <p:blipFill>
+          <a:blip r:embed="rId2"/>
+          <a:stretch>
+            <a:fillRect/>
+          </a:stretch>
+        </p:blipFill>
+        <p:spPr>
+          <a:xfrm>
+            <a:off x="1411811" y="2667370"/>
+            <a:ext cx="9888330" cy="2724530"/>
+          </a:xfrm>
+          <a:prstGeom prst="rect">
+            <a:avLst/>
+          </a:prstGeom>
+        </p:spPr>
+      </p:pic>
+    </p:spTree>
+    <p:extLst>
+      <p:ext uri="{BB962C8B-B14F-4D97-AF65-F5344CB8AC3E}">
+        <p14:creationId xmlns:p14="http://schemas.microsoft.com/office/powerpoint/2010/main" val="3282855946"/>
+      </p:ext>
+    </p:extLst>
+  </p:cSld>
+  <p:clrMapOvr>
+    <a:masterClrMapping/>
+  </p:clrMapOvr>
+  <p:timing>
+    <p:tnLst>
+      <p:par>
+        <p:cTn id="1" dur="indefinite" restart="never" nodeType="tmRoot">
+          <p:childTnLst>
+            <p:seq concurrent="1" nextAc="seek">
+              <p:cTn id="2" dur="indefinite" nodeType="mainSeq">
+                <p:childTnLst>
+                  <p:par>
+                    <p:cTn id="3" fill="hold">
+                      <p:stCondLst>
+                        <p:cond delay="indefinite"/>
+                      </p:stCondLst>
+                      <p:childTnLst>
+                        <p:par>
+                          <p:cTn id="4" fill="hold">
+                            <p:stCondLst>
+                              <p:cond delay="0"/>
+                            </p:stCondLst>
+                            <p:childTnLst>
+                              <p:par>
+                                <p:cTn id="5" presetID="10" presetClass="entr" presetSubtype="0" fill="hold" grpId="0" nodeType="clickEffect">
+                                  <p:stCondLst>
+                                    <p:cond delay="0"/>
+                                  </p:stCondLst>
+                                  <p:childTnLst>
+                                    <p:set>
+                                      <p:cBhvr>
+                                        <p:cTn id="6" dur="1" fill="hold">
+                                          <p:stCondLst>
+                                            <p:cond delay="0"/>
+                                          </p:stCondLst>
+                                        </p:cTn>
+                                        <p:tgtEl>
+                                          <p:spTgt spid="3">
+                                            <p:txEl>
+                                              <p:pRg st="0" end="0"/>
+                                            </p:txEl>
+                                          </p:spTgt>
+                                        </p:tgtEl>
+                                        <p:attrNameLst>
+                                          <p:attrName>style.visibility</p:attrName>
+                                        </p:attrNameLst>
+                                      </p:cBhvr>
+                                      <p:to>
+                                        <p:strVal val="visible"/>
+                                      </p:to>
+                                    </p:set>
+                                    <p:animEffect transition="in" filter="fade">
+                                      <p:cBhvr>
+                                        <p:cTn id="7" dur="500"/>
+                                        <p:tgtEl>
+                                          <p:spTgt spid="3">
+                                            <p:txEl>
+                                              <p:pRg st="0" end="0"/>
+                                            </p:txEl>
+                                          </p:spTgt>
+                                        </p:tgtEl>
+                                      </p:cBhvr>
+                                    </p:animEffect>
+                                  </p:childTnLst>
+                                </p:cTn>
+                              </p:par>
+                            </p:childTnLst>
+                          </p:cTn>
+                        </p:par>
+                      </p:childTnLst>
+                    </p:cTn>
+                  </p:par>
+                </p:childTnLst>
+              </p:cTn>
+              <p:prevCondLst>
+                <p:cond evt="onPrev" delay="0">
+                  <p:tgtEl>
+                    <p:sldTgt/>
+                  </p:tgtEl>
+                </p:cond>
+              </p:prevCondLst>
+              <p:nextCondLst>
+                <p:cond evt="onNext" delay="0">
+                  <p:tgtEl>
+                    <p:sldTgt/>
+                  </p:tgtEl>
+                </p:cond>
+              </p:nextCondLst>
+            </p:seq>
+          </p:childTnLst>
+        </p:cTn>
+      </p:par>
+    </p:tnLst>
+    <p:bldLst>
+      <p:bldP spid="3" grpId="0" build="p"/>
+    </p:bldLst>
+  </p:timing>
+</p:sld>
+</file>
+
+<file path=ppt/slides/slide20.xml><?xml version="1.0" encoding="utf-8"?>
 <p:sld xmlns:a="http://schemas.openxmlformats.org/drawingml/2006/main" xmlns:r="http://schemas.openxmlformats.org/officeDocument/2006/relationships" xmlns:p="http://schemas.openxmlformats.org/presentationml/2006/main">
   <p:cSld>
     <p:spTree>
@@ -8504,238 +9175,7 @@
 </p:sld>
 </file>
 
-<file path=ppt/slides/slide2.xml><?xml version="1.0" encoding="utf-8"?>
-<p:sld xmlns:a="http://schemas.openxmlformats.org/drawingml/2006/main" xmlns:r="http://schemas.openxmlformats.org/officeDocument/2006/relationships" xmlns:p="http://schemas.openxmlformats.org/presentationml/2006/main">
-  <p:cSld>
-    <p:spTree>
-      <p:nvGrpSpPr>
-        <p:cNvPr id="1" name=""/>
-        <p:cNvGrpSpPr/>
-        <p:nvPr/>
-      </p:nvGrpSpPr>
-      <p:grpSpPr>
-        <a:xfrm>
-          <a:off x="0" y="0"/>
-          <a:ext cx="0" cy="0"/>
-          <a:chOff x="0" y="0"/>
-          <a:chExt cx="0" cy="0"/>
-        </a:xfrm>
-      </p:grpSpPr>
-      <p:sp>
-        <p:nvSpPr>
-          <p:cNvPr id="2" name="Titel 1"/>
-          <p:cNvSpPr>
-            <a:spLocks noGrp="1"/>
-          </p:cNvSpPr>
-          <p:nvPr>
-            <p:ph type="title"/>
-          </p:nvPr>
-        </p:nvSpPr>
-        <p:spPr/>
-        <p:txBody>
-          <a:bodyPr/>
-          <a:lstStyle/>
-          <a:p>
-            <a:r>
-              <a:rPr lang="de-AT" dirty="0"/>
-              <a:t>CSS </a:t>
-            </a:r>
-            <a:r>
-              <a:rPr lang="de-AT" dirty="0" err="1"/>
-              <a:t>Flexbox</a:t>
-            </a:r>
-            <a:r>
-              <a:rPr lang="de-AT" dirty="0"/>
-              <a:t> </a:t>
-            </a:r>
-            <a:r>
-              <a:rPr lang="de-AT" dirty="0" err="1"/>
-              <a:t>vs</a:t>
-            </a:r>
-            <a:r>
-              <a:rPr lang="de-AT" dirty="0"/>
-              <a:t> </a:t>
-            </a:r>
-            <a:r>
-              <a:rPr lang="de-AT" dirty="0" err="1"/>
-              <a:t>other</a:t>
-            </a:r>
-            <a:r>
-              <a:rPr lang="de-AT" dirty="0"/>
-              <a:t> Layouts</a:t>
-            </a:r>
-            <a:endParaRPr lang="en-US" dirty="0"/>
-          </a:p>
-        </p:txBody>
-      </p:sp>
-      <p:sp>
-        <p:nvSpPr>
-          <p:cNvPr id="3" name="Inhaltsplatzhalter 2"/>
-          <p:cNvSpPr>
-            <a:spLocks noGrp="1"/>
-          </p:cNvSpPr>
-          <p:nvPr>
-            <p:ph idx="1"/>
-          </p:nvPr>
-        </p:nvSpPr>
-        <p:spPr>
-          <a:xfrm>
-            <a:off x="1181100" y="1869653"/>
-            <a:ext cx="5729969" cy="4988347"/>
-          </a:xfrm>
-        </p:spPr>
-        <p:txBody>
-          <a:bodyPr>
-            <a:normAutofit/>
-          </a:bodyPr>
-          <a:lstStyle/>
-          <a:p>
-            <a:r>
-              <a:rPr lang="de-DE" dirty="0"/>
-              <a:t>Ressource: 3.CSS/Codebeispiele/Layout/</a:t>
-            </a:r>
-            <a:endParaRPr lang="en-US" dirty="0"/>
-          </a:p>
-        </p:txBody>
-      </p:sp>
-      <p:pic>
-        <p:nvPicPr>
-          <p:cNvPr id="5" name="Grafik 4">
-            <a:extLst>
-              <a:ext uri="{FF2B5EF4-FFF2-40B4-BE49-F238E27FC236}">
-                <a16:creationId xmlns:a16="http://schemas.microsoft.com/office/drawing/2014/main" id="{F9EDBB7D-5B47-58A4-77DE-954353DDB123}"/>
-              </a:ext>
-            </a:extLst>
-          </p:cNvPr>
-          <p:cNvPicPr>
-            <a:picLocks noChangeAspect="1"/>
-          </p:cNvPicPr>
-          <p:nvPr/>
-        </p:nvPicPr>
-        <p:blipFill>
-          <a:blip r:embed="rId2"/>
-          <a:stretch>
-            <a:fillRect/>
-          </a:stretch>
-        </p:blipFill>
-        <p:spPr>
-          <a:xfrm>
-            <a:off x="1411811" y="2667370"/>
-            <a:ext cx="9888330" cy="2724530"/>
-          </a:xfrm>
-          <a:prstGeom prst="rect">
-            <a:avLst/>
-          </a:prstGeom>
-        </p:spPr>
-      </p:pic>
-    </p:spTree>
-    <p:extLst>
-      <p:ext uri="{BB962C8B-B14F-4D97-AF65-F5344CB8AC3E}">
-        <p14:creationId xmlns:p14="http://schemas.microsoft.com/office/powerpoint/2010/main" val="3282855946"/>
-      </p:ext>
-    </p:extLst>
-  </p:cSld>
-  <p:clrMapOvr>
-    <a:masterClrMapping/>
-  </p:clrMapOvr>
-  <p:timing>
-    <p:tnLst>
-      <p:par>
-        <p:cTn id="1" dur="indefinite" restart="never" nodeType="tmRoot">
-          <p:childTnLst>
-            <p:seq concurrent="1" nextAc="seek">
-              <p:cTn id="2" dur="indefinite" nodeType="mainSeq">
-                <p:childTnLst>
-                  <p:par>
-                    <p:cTn id="3" fill="hold">
-                      <p:stCondLst>
-                        <p:cond delay="indefinite"/>
-                      </p:stCondLst>
-                      <p:childTnLst>
-                        <p:par>
-                          <p:cTn id="4" fill="hold">
-                            <p:stCondLst>
-                              <p:cond delay="0"/>
-                            </p:stCondLst>
-                            <p:childTnLst>
-                              <p:par>
-                                <p:cTn id="5" presetID="10" presetClass="entr" presetSubtype="0" fill="hold" grpId="0" nodeType="clickEffect">
-                                  <p:stCondLst>
-                                    <p:cond delay="0"/>
-                                  </p:stCondLst>
-                                  <p:childTnLst>
-                                    <p:set>
-                                      <p:cBhvr>
-                                        <p:cTn id="6" dur="1" fill="hold">
-                                          <p:stCondLst>
-                                            <p:cond delay="0"/>
-                                          </p:stCondLst>
-                                        </p:cTn>
-                                        <p:tgtEl>
-                                          <p:spTgt spid="3">
-                                            <p:txEl>
-                                              <p:pRg st="0" end="0"/>
-                                            </p:txEl>
-                                          </p:spTgt>
-                                        </p:tgtEl>
-                                        <p:attrNameLst>
-                                          <p:attrName>style.visibility</p:attrName>
-                                        </p:attrNameLst>
-                                      </p:cBhvr>
-                                      <p:to>
-                                        <p:strVal val="visible"/>
-                                      </p:to>
-                                    </p:set>
-                                    <p:animEffect transition="in" filter="fade">
-                                      <p:cBhvr>
-                                        <p:cTn id="7" dur="500"/>
-                                        <p:tgtEl>
-                                          <p:spTgt spid="3">
-                                            <p:txEl>
-                                              <p:pRg st="0" end="0"/>
-                                            </p:txEl>
-                                          </p:spTgt>
-                                        </p:tgtEl>
-                                      </p:cBhvr>
-                                    </p:animEffect>
-                                  </p:childTnLst>
-                                </p:cTn>
-                              </p:par>
-                            </p:childTnLst>
-                          </p:cTn>
-                        </p:par>
-                      </p:childTnLst>
-                    </p:cTn>
-                  </p:par>
-                </p:childTnLst>
-              </p:cTn>
-              <p:prevCondLst>
-                <p:cond evt="onPrev" delay="0">
-                  <p:tgtEl>
-                    <p:sldTgt/>
-                  </p:tgtEl>
-                </p:cond>
-              </p:prevCondLst>
-              <p:nextCondLst>
-                <p:cond evt="onNext" delay="0">
-                  <p:tgtEl>
-                    <p:sldTgt/>
-                  </p:tgtEl>
-                </p:cond>
-              </p:nextCondLst>
-            </p:seq>
-          </p:childTnLst>
-        </p:cTn>
-      </p:par>
-    </p:tnLst>
-    <p:bldLst>
-      <p:bldP spid="3" grpId="0" build="p"/>
-    </p:bldLst>
-  </p:timing>
-</p:sld>
-</file>
-
-<file path=ppt/slides/slide20.xml><?xml version="1.0" encoding="utf-8"?>
+<file path=ppt/slides/slide21.xml><?xml version="1.0" encoding="utf-8"?>
 <p:sld xmlns:a="http://schemas.openxmlformats.org/drawingml/2006/main" xmlns:r="http://schemas.openxmlformats.org/officeDocument/2006/relationships" xmlns:p="http://schemas.openxmlformats.org/presentationml/2006/main">
   <p:cSld>
     <p:spTree>
@@ -9154,7 +9594,7 @@
 </p:sld>
 </file>
 
-<file path=ppt/slides/slide21.xml><?xml version="1.0" encoding="utf-8"?>
+<file path=ppt/slides/slide22.xml><?xml version="1.0" encoding="utf-8"?>
 <p:sld xmlns:a="http://schemas.openxmlformats.org/drawingml/2006/main" xmlns:r="http://schemas.openxmlformats.org/officeDocument/2006/relationships" xmlns:p="http://schemas.openxmlformats.org/presentationml/2006/main">
   <p:cSld>
     <p:spTree>
@@ -9742,7 +10182,7 @@
 </p:sld>
 </file>
 
-<file path=ppt/slides/slide22.xml><?xml version="1.0" encoding="utf-8"?>
+<file path=ppt/slides/slide23.xml><?xml version="1.0" encoding="utf-8"?>
 <p:sld xmlns:a="http://schemas.openxmlformats.org/drawingml/2006/main" xmlns:r="http://schemas.openxmlformats.org/officeDocument/2006/relationships" xmlns:p="http://schemas.openxmlformats.org/presentationml/2006/main">
   <p:cSld>
     <p:spTree>
@@ -10069,7 +10509,7 @@
 </p:sld>
 </file>
 
-<file path=ppt/slides/slide23.xml><?xml version="1.0" encoding="utf-8"?>
+<file path=ppt/slides/slide24.xml><?xml version="1.0" encoding="utf-8"?>
 <p:sld xmlns:a="http://schemas.openxmlformats.org/drawingml/2006/main" xmlns:r="http://schemas.openxmlformats.org/officeDocument/2006/relationships" xmlns:p="http://schemas.openxmlformats.org/presentationml/2006/main">
   <p:cSld>
     <p:spTree>
@@ -10396,7 +10836,7 @@
 </p:sld>
 </file>
 
-<file path=ppt/slides/slide24.xml><?xml version="1.0" encoding="utf-8"?>
+<file path=ppt/slides/slide25.xml><?xml version="1.0" encoding="utf-8"?>
 <p:sld xmlns:a="http://schemas.openxmlformats.org/drawingml/2006/main" xmlns:r="http://schemas.openxmlformats.org/officeDocument/2006/relationships" xmlns:p="http://schemas.openxmlformats.org/presentationml/2006/main">
   <p:cSld>
     <p:spTree>
@@ -10538,7 +10978,7 @@
 </p:sld>
 </file>
 
-<file path=ppt/slides/slide25.xml><?xml version="1.0" encoding="utf-8"?>
+<file path=ppt/slides/slide26.xml><?xml version="1.0" encoding="utf-8"?>
 <p:sld xmlns:a="http://schemas.openxmlformats.org/drawingml/2006/main" xmlns:r="http://schemas.openxmlformats.org/officeDocument/2006/relationships" xmlns:p="http://schemas.openxmlformats.org/presentationml/2006/main">
   <p:cSld>
     <p:spTree>
@@ -11096,7 +11536,7 @@
 </p:sld>
 </file>
 
-<file path=ppt/slides/slide26.xml><?xml version="1.0" encoding="utf-8"?>
+<file path=ppt/slides/slide27.xml><?xml version="1.0" encoding="utf-8"?>
 <p:sld xmlns:a="http://schemas.openxmlformats.org/drawingml/2006/main" xmlns:r="http://schemas.openxmlformats.org/officeDocument/2006/relationships" xmlns:p="http://schemas.openxmlformats.org/presentationml/2006/main">
   <p:cSld>
     <p:spTree>
@@ -11822,7 +12262,7 @@
 </p:sld>
 </file>
 
-<file path=ppt/slides/slide27.xml><?xml version="1.0" encoding="utf-8"?>
+<file path=ppt/slides/slide28.xml><?xml version="1.0" encoding="utf-8"?>
 <p:sld xmlns:a="http://schemas.openxmlformats.org/drawingml/2006/main" xmlns:r="http://schemas.openxmlformats.org/officeDocument/2006/relationships" xmlns:p="http://schemas.openxmlformats.org/presentationml/2006/main">
   <p:cSld>
     <p:spTree>
@@ -12462,7 +12902,7 @@
 </p:sld>
 </file>
 
-<file path=ppt/slides/slide28.xml><?xml version="1.0" encoding="utf-8"?>
+<file path=ppt/slides/slide29.xml><?xml version="1.0" encoding="utf-8"?>
 <p:sld xmlns:a="http://schemas.openxmlformats.org/drawingml/2006/main" xmlns:r="http://schemas.openxmlformats.org/officeDocument/2006/relationships" xmlns:p="http://schemas.openxmlformats.org/presentationml/2006/main">
   <p:cSld>
     <p:spTree>
@@ -12808,7 +13248,802 @@
 </p:sld>
 </file>
 
-<file path=ppt/slides/slide29.xml><?xml version="1.0" encoding="utf-8"?>
+<file path=ppt/slides/slide3.xml><?xml version="1.0" encoding="utf-8"?>
+<p:sld xmlns:a="http://schemas.openxmlformats.org/drawingml/2006/main" xmlns:r="http://schemas.openxmlformats.org/officeDocument/2006/relationships" xmlns:p="http://schemas.openxmlformats.org/presentationml/2006/main">
+  <p:cSld>
+    <p:spTree>
+      <p:nvGrpSpPr>
+        <p:cNvPr id="1" name=""/>
+        <p:cNvGrpSpPr/>
+        <p:nvPr/>
+      </p:nvGrpSpPr>
+      <p:grpSpPr>
+        <a:xfrm>
+          <a:off x="0" y="0"/>
+          <a:ext cx="0" cy="0"/>
+          <a:chOff x="0" y="0"/>
+          <a:chExt cx="0" cy="0"/>
+        </a:xfrm>
+      </p:grpSpPr>
+      <p:sp>
+        <p:nvSpPr>
+          <p:cNvPr id="2" name="Titel 1"/>
+          <p:cNvSpPr>
+            <a:spLocks noGrp="1"/>
+          </p:cNvSpPr>
+          <p:nvPr>
+            <p:ph type="title"/>
+          </p:nvPr>
+        </p:nvSpPr>
+        <p:spPr/>
+        <p:txBody>
+          <a:bodyPr/>
+          <a:lstStyle/>
+          <a:p>
+            <a:r>
+              <a:rPr lang="de-AT" dirty="0"/>
+              <a:t>CSS </a:t>
+            </a:r>
+            <a:r>
+              <a:rPr lang="de-AT" dirty="0" err="1"/>
+              <a:t>Flexbox</a:t>
+            </a:r>
+            <a:endParaRPr lang="en-US" dirty="0"/>
+          </a:p>
+        </p:txBody>
+      </p:sp>
+      <p:sp>
+        <p:nvSpPr>
+          <p:cNvPr id="3" name="Inhaltsplatzhalter 2"/>
+          <p:cNvSpPr>
+            <a:spLocks noGrp="1"/>
+          </p:cNvSpPr>
+          <p:nvPr>
+            <p:ph idx="1"/>
+          </p:nvPr>
+        </p:nvSpPr>
+        <p:spPr>
+          <a:xfrm>
+            <a:off x="1181100" y="1869653"/>
+            <a:ext cx="5729969" cy="4988347"/>
+          </a:xfrm>
+        </p:spPr>
+        <p:txBody>
+          <a:bodyPr>
+            <a:normAutofit fontScale="92500" lnSpcReduction="20000"/>
+          </a:bodyPr>
+          <a:lstStyle/>
+          <a:p>
+            <a:r>
+              <a:rPr lang="de-DE" dirty="0"/>
+              <a:t>Das Modul für das flexible Box-Layout erleichtert die Gestaltung flexibler, reaktionsfähiger </a:t>
+            </a:r>
+            <a:r>
+              <a:rPr lang="de-DE" dirty="0" err="1"/>
+              <a:t>Layoutstrukturen</a:t>
+            </a:r>
+            <a:r>
+              <a:rPr lang="de-DE" dirty="0"/>
+              <a:t>.</a:t>
+            </a:r>
+          </a:p>
+          <a:p>
+            <a:r>
+              <a:rPr lang="de-DE" dirty="0"/>
+              <a:t>Anwendungsbereich eher bei </a:t>
+            </a:r>
+            <a:r>
+              <a:rPr lang="de-DE" b="1" dirty="0"/>
+              <a:t>1-dimensionale </a:t>
+            </a:r>
+            <a:r>
+              <a:rPr lang="de-DE" dirty="0"/>
+              <a:t>Strukturen</a:t>
+            </a:r>
+          </a:p>
+          <a:p>
+            <a:r>
+              <a:rPr lang="de-DE" dirty="0"/>
+              <a:t>Ein flexibles Layout muss ein übergeordnetes Element haben, bei dem die Eigenschaft "</a:t>
+            </a:r>
+            <a:r>
+              <a:rPr lang="de-DE" dirty="0" err="1"/>
+              <a:t>display</a:t>
+            </a:r>
+            <a:r>
+              <a:rPr lang="de-DE" dirty="0"/>
+              <a:t>" auf "</a:t>
+            </a:r>
+            <a:r>
+              <a:rPr lang="de-DE" dirty="0" err="1"/>
+              <a:t>flex</a:t>
+            </a:r>
+            <a:r>
+              <a:rPr lang="de-DE" dirty="0"/>
+              <a:t>" gesetzt ist.</a:t>
+            </a:r>
+          </a:p>
+          <a:p>
+            <a:r>
+              <a:rPr lang="de-DE" dirty="0"/>
+              <a:t>Die direkten Child-Elemente des flexiblen Containers werden automatisch zu flexiblen Elementen.</a:t>
+            </a:r>
+          </a:p>
+          <a:p>
+            <a:r>
+              <a:rPr lang="de-DE" dirty="0"/>
+              <a:t>Über weitere Flex-Eigenschaften kann das Layout genau definiert werden</a:t>
+            </a:r>
+          </a:p>
+          <a:p>
+            <a:pPr lvl="1"/>
+            <a:r>
+              <a:rPr lang="de-DE" dirty="0"/>
+              <a:t>Flex-</a:t>
+            </a:r>
+            <a:r>
+              <a:rPr lang="de-DE" dirty="0" err="1"/>
+              <a:t>direction</a:t>
+            </a:r>
+            <a:endParaRPr lang="de-DE" dirty="0"/>
+          </a:p>
+          <a:p>
+            <a:pPr lvl="1"/>
+            <a:r>
+              <a:rPr lang="de-DE" dirty="0" err="1"/>
+              <a:t>Align</a:t>
+            </a:r>
+            <a:r>
+              <a:rPr lang="de-DE" dirty="0"/>
+              <a:t>-items</a:t>
+            </a:r>
+          </a:p>
+          <a:p>
+            <a:pPr lvl="1"/>
+            <a:r>
+              <a:rPr lang="de-DE" dirty="0" err="1"/>
+              <a:t>Justify</a:t>
+            </a:r>
+            <a:r>
+              <a:rPr lang="de-DE" dirty="0"/>
+              <a:t>-content</a:t>
+            </a:r>
+          </a:p>
+          <a:p>
+            <a:pPr lvl="1"/>
+            <a:r>
+              <a:rPr lang="de-DE" dirty="0" err="1"/>
+              <a:t>Align</a:t>
+            </a:r>
+            <a:r>
+              <a:rPr lang="de-DE" dirty="0"/>
+              <a:t>-content</a:t>
+            </a:r>
+          </a:p>
+          <a:p>
+            <a:pPr lvl="1"/>
+            <a:r>
+              <a:rPr lang="de-DE" dirty="0"/>
+              <a:t>…</a:t>
+            </a:r>
+            <a:endParaRPr lang="en-US" dirty="0"/>
+          </a:p>
+        </p:txBody>
+      </p:sp>
+      <p:pic>
+        <p:nvPicPr>
+          <p:cNvPr id="6" name="Grafik 5"/>
+          <p:cNvPicPr>
+            <a:picLocks noChangeAspect="1"/>
+          </p:cNvPicPr>
+          <p:nvPr/>
+        </p:nvPicPr>
+        <p:blipFill rotWithShape="1">
+          <a:blip r:embed="rId2"/>
+          <a:srcRect t="1450"/>
+          <a:stretch/>
+        </p:blipFill>
+        <p:spPr>
+          <a:xfrm>
+            <a:off x="7125684" y="2057400"/>
+            <a:ext cx="3642632" cy="2654706"/>
+          </a:xfrm>
+          <a:prstGeom prst="rect">
+            <a:avLst/>
+          </a:prstGeom>
+        </p:spPr>
+      </p:pic>
+      <p:pic>
+        <p:nvPicPr>
+          <p:cNvPr id="7" name="Grafik 6"/>
+          <p:cNvPicPr>
+            <a:picLocks noChangeAspect="1"/>
+          </p:cNvPicPr>
+          <p:nvPr/>
+        </p:nvPicPr>
+        <p:blipFill>
+          <a:blip r:embed="rId3"/>
+          <a:stretch>
+            <a:fillRect/>
+          </a:stretch>
+        </p:blipFill>
+        <p:spPr>
+          <a:xfrm>
+            <a:off x="7231516" y="5161085"/>
+            <a:ext cx="4289008" cy="1327335"/>
+          </a:xfrm>
+          <a:prstGeom prst="rect">
+            <a:avLst/>
+          </a:prstGeom>
+        </p:spPr>
+      </p:pic>
+    </p:spTree>
+    <p:extLst>
+      <p:ext uri="{BB962C8B-B14F-4D97-AF65-F5344CB8AC3E}">
+        <p14:creationId xmlns:p14="http://schemas.microsoft.com/office/powerpoint/2010/main" val="932580139"/>
+      </p:ext>
+    </p:extLst>
+  </p:cSld>
+  <p:clrMapOvr>
+    <a:masterClrMapping/>
+  </p:clrMapOvr>
+  <p:timing>
+    <p:tnLst>
+      <p:par>
+        <p:cTn id="1" dur="indefinite" restart="never" nodeType="tmRoot">
+          <p:childTnLst>
+            <p:seq concurrent="1" nextAc="seek">
+              <p:cTn id="2" dur="indefinite" nodeType="mainSeq">
+                <p:childTnLst>
+                  <p:par>
+                    <p:cTn id="3" fill="hold">
+                      <p:stCondLst>
+                        <p:cond delay="indefinite"/>
+                      </p:stCondLst>
+                      <p:childTnLst>
+                        <p:par>
+                          <p:cTn id="4" fill="hold">
+                            <p:stCondLst>
+                              <p:cond delay="0"/>
+                            </p:stCondLst>
+                            <p:childTnLst>
+                              <p:par>
+                                <p:cTn id="5" presetID="10" presetClass="entr" presetSubtype="0" fill="hold" grpId="0" nodeType="clickEffect">
+                                  <p:stCondLst>
+                                    <p:cond delay="0"/>
+                                  </p:stCondLst>
+                                  <p:childTnLst>
+                                    <p:set>
+                                      <p:cBhvr>
+                                        <p:cTn id="6" dur="1" fill="hold">
+                                          <p:stCondLst>
+                                            <p:cond delay="0"/>
+                                          </p:stCondLst>
+                                        </p:cTn>
+                                        <p:tgtEl>
+                                          <p:spTgt spid="3">
+                                            <p:txEl>
+                                              <p:pRg st="0" end="0"/>
+                                            </p:txEl>
+                                          </p:spTgt>
+                                        </p:tgtEl>
+                                        <p:attrNameLst>
+                                          <p:attrName>style.visibility</p:attrName>
+                                        </p:attrNameLst>
+                                      </p:cBhvr>
+                                      <p:to>
+                                        <p:strVal val="visible"/>
+                                      </p:to>
+                                    </p:set>
+                                    <p:animEffect transition="in" filter="fade">
+                                      <p:cBhvr>
+                                        <p:cTn id="7" dur="500"/>
+                                        <p:tgtEl>
+                                          <p:spTgt spid="3">
+                                            <p:txEl>
+                                              <p:pRg st="0" end="0"/>
+                                            </p:txEl>
+                                          </p:spTgt>
+                                        </p:tgtEl>
+                                      </p:cBhvr>
+                                    </p:animEffect>
+                                  </p:childTnLst>
+                                </p:cTn>
+                              </p:par>
+                            </p:childTnLst>
+                          </p:cTn>
+                        </p:par>
+                      </p:childTnLst>
+                    </p:cTn>
+                  </p:par>
+                  <p:par>
+                    <p:cTn id="8" fill="hold">
+                      <p:stCondLst>
+                        <p:cond delay="indefinite"/>
+                      </p:stCondLst>
+                      <p:childTnLst>
+                        <p:par>
+                          <p:cTn id="9" fill="hold">
+                            <p:stCondLst>
+                              <p:cond delay="0"/>
+                            </p:stCondLst>
+                            <p:childTnLst>
+                              <p:par>
+                                <p:cTn id="10" presetID="10" presetClass="entr" presetSubtype="0" fill="hold" grpId="0" nodeType="clickEffect">
+                                  <p:stCondLst>
+                                    <p:cond delay="0"/>
+                                  </p:stCondLst>
+                                  <p:childTnLst>
+                                    <p:set>
+                                      <p:cBhvr>
+                                        <p:cTn id="11" dur="1" fill="hold">
+                                          <p:stCondLst>
+                                            <p:cond delay="0"/>
+                                          </p:stCondLst>
+                                        </p:cTn>
+                                        <p:tgtEl>
+                                          <p:spTgt spid="3">
+                                            <p:txEl>
+                                              <p:pRg st="1" end="1"/>
+                                            </p:txEl>
+                                          </p:spTgt>
+                                        </p:tgtEl>
+                                        <p:attrNameLst>
+                                          <p:attrName>style.visibility</p:attrName>
+                                        </p:attrNameLst>
+                                      </p:cBhvr>
+                                      <p:to>
+                                        <p:strVal val="visible"/>
+                                      </p:to>
+                                    </p:set>
+                                    <p:animEffect transition="in" filter="fade">
+                                      <p:cBhvr>
+                                        <p:cTn id="12" dur="500"/>
+                                        <p:tgtEl>
+                                          <p:spTgt spid="3">
+                                            <p:txEl>
+                                              <p:pRg st="1" end="1"/>
+                                            </p:txEl>
+                                          </p:spTgt>
+                                        </p:tgtEl>
+                                      </p:cBhvr>
+                                    </p:animEffect>
+                                  </p:childTnLst>
+                                </p:cTn>
+                              </p:par>
+                            </p:childTnLst>
+                          </p:cTn>
+                        </p:par>
+                      </p:childTnLst>
+                    </p:cTn>
+                  </p:par>
+                  <p:par>
+                    <p:cTn id="13" fill="hold">
+                      <p:stCondLst>
+                        <p:cond delay="indefinite"/>
+                      </p:stCondLst>
+                      <p:childTnLst>
+                        <p:par>
+                          <p:cTn id="14" fill="hold">
+                            <p:stCondLst>
+                              <p:cond delay="0"/>
+                            </p:stCondLst>
+                            <p:childTnLst>
+                              <p:par>
+                                <p:cTn id="15" presetID="10" presetClass="entr" presetSubtype="0" fill="hold" grpId="0" nodeType="clickEffect">
+                                  <p:stCondLst>
+                                    <p:cond delay="0"/>
+                                  </p:stCondLst>
+                                  <p:childTnLst>
+                                    <p:set>
+                                      <p:cBhvr>
+                                        <p:cTn id="16" dur="1" fill="hold">
+                                          <p:stCondLst>
+                                            <p:cond delay="0"/>
+                                          </p:stCondLst>
+                                        </p:cTn>
+                                        <p:tgtEl>
+                                          <p:spTgt spid="3">
+                                            <p:txEl>
+                                              <p:pRg st="2" end="2"/>
+                                            </p:txEl>
+                                          </p:spTgt>
+                                        </p:tgtEl>
+                                        <p:attrNameLst>
+                                          <p:attrName>style.visibility</p:attrName>
+                                        </p:attrNameLst>
+                                      </p:cBhvr>
+                                      <p:to>
+                                        <p:strVal val="visible"/>
+                                      </p:to>
+                                    </p:set>
+                                    <p:animEffect transition="in" filter="fade">
+                                      <p:cBhvr>
+                                        <p:cTn id="17" dur="500"/>
+                                        <p:tgtEl>
+                                          <p:spTgt spid="3">
+                                            <p:txEl>
+                                              <p:pRg st="2" end="2"/>
+                                            </p:txEl>
+                                          </p:spTgt>
+                                        </p:tgtEl>
+                                      </p:cBhvr>
+                                    </p:animEffect>
+                                  </p:childTnLst>
+                                </p:cTn>
+                              </p:par>
+                            </p:childTnLst>
+                          </p:cTn>
+                        </p:par>
+                      </p:childTnLst>
+                    </p:cTn>
+                  </p:par>
+                  <p:par>
+                    <p:cTn id="18" fill="hold">
+                      <p:stCondLst>
+                        <p:cond delay="indefinite"/>
+                      </p:stCondLst>
+                      <p:childTnLst>
+                        <p:par>
+                          <p:cTn id="19" fill="hold">
+                            <p:stCondLst>
+                              <p:cond delay="0"/>
+                            </p:stCondLst>
+                            <p:childTnLst>
+                              <p:par>
+                                <p:cTn id="20" presetID="10" presetClass="entr" presetSubtype="0" fill="hold" grpId="0" nodeType="clickEffect">
+                                  <p:stCondLst>
+                                    <p:cond delay="0"/>
+                                  </p:stCondLst>
+                                  <p:childTnLst>
+                                    <p:set>
+                                      <p:cBhvr>
+                                        <p:cTn id="21" dur="1" fill="hold">
+                                          <p:stCondLst>
+                                            <p:cond delay="0"/>
+                                          </p:stCondLst>
+                                        </p:cTn>
+                                        <p:tgtEl>
+                                          <p:spTgt spid="3">
+                                            <p:txEl>
+                                              <p:pRg st="3" end="3"/>
+                                            </p:txEl>
+                                          </p:spTgt>
+                                        </p:tgtEl>
+                                        <p:attrNameLst>
+                                          <p:attrName>style.visibility</p:attrName>
+                                        </p:attrNameLst>
+                                      </p:cBhvr>
+                                      <p:to>
+                                        <p:strVal val="visible"/>
+                                      </p:to>
+                                    </p:set>
+                                    <p:animEffect transition="in" filter="fade">
+                                      <p:cBhvr>
+                                        <p:cTn id="22" dur="500"/>
+                                        <p:tgtEl>
+                                          <p:spTgt spid="3">
+                                            <p:txEl>
+                                              <p:pRg st="3" end="3"/>
+                                            </p:txEl>
+                                          </p:spTgt>
+                                        </p:tgtEl>
+                                      </p:cBhvr>
+                                    </p:animEffect>
+                                  </p:childTnLst>
+                                </p:cTn>
+                              </p:par>
+                            </p:childTnLst>
+                          </p:cTn>
+                        </p:par>
+                      </p:childTnLst>
+                    </p:cTn>
+                  </p:par>
+                  <p:par>
+                    <p:cTn id="23" fill="hold">
+                      <p:stCondLst>
+                        <p:cond delay="indefinite"/>
+                      </p:stCondLst>
+                      <p:childTnLst>
+                        <p:par>
+                          <p:cTn id="24" fill="hold">
+                            <p:stCondLst>
+                              <p:cond delay="0"/>
+                            </p:stCondLst>
+                            <p:childTnLst>
+                              <p:par>
+                                <p:cTn id="25" presetID="10" presetClass="entr" presetSubtype="0" fill="hold" grpId="0" nodeType="clickEffect">
+                                  <p:stCondLst>
+                                    <p:cond delay="0"/>
+                                  </p:stCondLst>
+                                  <p:childTnLst>
+                                    <p:set>
+                                      <p:cBhvr>
+                                        <p:cTn id="26" dur="1" fill="hold">
+                                          <p:stCondLst>
+                                            <p:cond delay="0"/>
+                                          </p:stCondLst>
+                                        </p:cTn>
+                                        <p:tgtEl>
+                                          <p:spTgt spid="3">
+                                            <p:txEl>
+                                              <p:pRg st="4" end="4"/>
+                                            </p:txEl>
+                                          </p:spTgt>
+                                        </p:tgtEl>
+                                        <p:attrNameLst>
+                                          <p:attrName>style.visibility</p:attrName>
+                                        </p:attrNameLst>
+                                      </p:cBhvr>
+                                      <p:to>
+                                        <p:strVal val="visible"/>
+                                      </p:to>
+                                    </p:set>
+                                    <p:animEffect transition="in" filter="fade">
+                                      <p:cBhvr>
+                                        <p:cTn id="27" dur="500"/>
+                                        <p:tgtEl>
+                                          <p:spTgt spid="3">
+                                            <p:txEl>
+                                              <p:pRg st="4" end="4"/>
+                                            </p:txEl>
+                                          </p:spTgt>
+                                        </p:tgtEl>
+                                      </p:cBhvr>
+                                    </p:animEffect>
+                                  </p:childTnLst>
+                                </p:cTn>
+                              </p:par>
+                              <p:par>
+                                <p:cTn id="28" presetID="10" presetClass="entr" presetSubtype="0" fill="hold" grpId="0" nodeType="withEffect">
+                                  <p:stCondLst>
+                                    <p:cond delay="0"/>
+                                  </p:stCondLst>
+                                  <p:childTnLst>
+                                    <p:set>
+                                      <p:cBhvr>
+                                        <p:cTn id="29" dur="1" fill="hold">
+                                          <p:stCondLst>
+                                            <p:cond delay="0"/>
+                                          </p:stCondLst>
+                                        </p:cTn>
+                                        <p:tgtEl>
+                                          <p:spTgt spid="3">
+                                            <p:txEl>
+                                              <p:pRg st="5" end="5"/>
+                                            </p:txEl>
+                                          </p:spTgt>
+                                        </p:tgtEl>
+                                        <p:attrNameLst>
+                                          <p:attrName>style.visibility</p:attrName>
+                                        </p:attrNameLst>
+                                      </p:cBhvr>
+                                      <p:to>
+                                        <p:strVal val="visible"/>
+                                      </p:to>
+                                    </p:set>
+                                    <p:animEffect transition="in" filter="fade">
+                                      <p:cBhvr>
+                                        <p:cTn id="30" dur="500"/>
+                                        <p:tgtEl>
+                                          <p:spTgt spid="3">
+                                            <p:txEl>
+                                              <p:pRg st="5" end="5"/>
+                                            </p:txEl>
+                                          </p:spTgt>
+                                        </p:tgtEl>
+                                      </p:cBhvr>
+                                    </p:animEffect>
+                                  </p:childTnLst>
+                                </p:cTn>
+                              </p:par>
+                              <p:par>
+                                <p:cTn id="31" presetID="10" presetClass="entr" presetSubtype="0" fill="hold" grpId="0" nodeType="withEffect">
+                                  <p:stCondLst>
+                                    <p:cond delay="0"/>
+                                  </p:stCondLst>
+                                  <p:childTnLst>
+                                    <p:set>
+                                      <p:cBhvr>
+                                        <p:cTn id="32" dur="1" fill="hold">
+                                          <p:stCondLst>
+                                            <p:cond delay="0"/>
+                                          </p:stCondLst>
+                                        </p:cTn>
+                                        <p:tgtEl>
+                                          <p:spTgt spid="3">
+                                            <p:txEl>
+                                              <p:pRg st="6" end="6"/>
+                                            </p:txEl>
+                                          </p:spTgt>
+                                        </p:tgtEl>
+                                        <p:attrNameLst>
+                                          <p:attrName>style.visibility</p:attrName>
+                                        </p:attrNameLst>
+                                      </p:cBhvr>
+                                      <p:to>
+                                        <p:strVal val="visible"/>
+                                      </p:to>
+                                    </p:set>
+                                    <p:animEffect transition="in" filter="fade">
+                                      <p:cBhvr>
+                                        <p:cTn id="33" dur="500"/>
+                                        <p:tgtEl>
+                                          <p:spTgt spid="3">
+                                            <p:txEl>
+                                              <p:pRg st="6" end="6"/>
+                                            </p:txEl>
+                                          </p:spTgt>
+                                        </p:tgtEl>
+                                      </p:cBhvr>
+                                    </p:animEffect>
+                                  </p:childTnLst>
+                                </p:cTn>
+                              </p:par>
+                              <p:par>
+                                <p:cTn id="34" presetID="10" presetClass="entr" presetSubtype="0" fill="hold" grpId="0" nodeType="withEffect">
+                                  <p:stCondLst>
+                                    <p:cond delay="0"/>
+                                  </p:stCondLst>
+                                  <p:childTnLst>
+                                    <p:set>
+                                      <p:cBhvr>
+                                        <p:cTn id="35" dur="1" fill="hold">
+                                          <p:stCondLst>
+                                            <p:cond delay="0"/>
+                                          </p:stCondLst>
+                                        </p:cTn>
+                                        <p:tgtEl>
+                                          <p:spTgt spid="3">
+                                            <p:txEl>
+                                              <p:pRg st="7" end="7"/>
+                                            </p:txEl>
+                                          </p:spTgt>
+                                        </p:tgtEl>
+                                        <p:attrNameLst>
+                                          <p:attrName>style.visibility</p:attrName>
+                                        </p:attrNameLst>
+                                      </p:cBhvr>
+                                      <p:to>
+                                        <p:strVal val="visible"/>
+                                      </p:to>
+                                    </p:set>
+                                    <p:animEffect transition="in" filter="fade">
+                                      <p:cBhvr>
+                                        <p:cTn id="36" dur="500"/>
+                                        <p:tgtEl>
+                                          <p:spTgt spid="3">
+                                            <p:txEl>
+                                              <p:pRg st="7" end="7"/>
+                                            </p:txEl>
+                                          </p:spTgt>
+                                        </p:tgtEl>
+                                      </p:cBhvr>
+                                    </p:animEffect>
+                                  </p:childTnLst>
+                                </p:cTn>
+                              </p:par>
+                              <p:par>
+                                <p:cTn id="37" presetID="10" presetClass="entr" presetSubtype="0" fill="hold" grpId="0" nodeType="withEffect">
+                                  <p:stCondLst>
+                                    <p:cond delay="0"/>
+                                  </p:stCondLst>
+                                  <p:childTnLst>
+                                    <p:set>
+                                      <p:cBhvr>
+                                        <p:cTn id="38" dur="1" fill="hold">
+                                          <p:stCondLst>
+                                            <p:cond delay="0"/>
+                                          </p:stCondLst>
+                                        </p:cTn>
+                                        <p:tgtEl>
+                                          <p:spTgt spid="3">
+                                            <p:txEl>
+                                              <p:pRg st="8" end="8"/>
+                                            </p:txEl>
+                                          </p:spTgt>
+                                        </p:tgtEl>
+                                        <p:attrNameLst>
+                                          <p:attrName>style.visibility</p:attrName>
+                                        </p:attrNameLst>
+                                      </p:cBhvr>
+                                      <p:to>
+                                        <p:strVal val="visible"/>
+                                      </p:to>
+                                    </p:set>
+                                    <p:animEffect transition="in" filter="fade">
+                                      <p:cBhvr>
+                                        <p:cTn id="39" dur="500"/>
+                                        <p:tgtEl>
+                                          <p:spTgt spid="3">
+                                            <p:txEl>
+                                              <p:pRg st="8" end="8"/>
+                                            </p:txEl>
+                                          </p:spTgt>
+                                        </p:tgtEl>
+                                      </p:cBhvr>
+                                    </p:animEffect>
+                                  </p:childTnLst>
+                                </p:cTn>
+                              </p:par>
+                              <p:par>
+                                <p:cTn id="40" presetID="10" presetClass="entr" presetSubtype="0" fill="hold" grpId="0" nodeType="withEffect">
+                                  <p:stCondLst>
+                                    <p:cond delay="0"/>
+                                  </p:stCondLst>
+                                  <p:childTnLst>
+                                    <p:set>
+                                      <p:cBhvr>
+                                        <p:cTn id="41" dur="1" fill="hold">
+                                          <p:stCondLst>
+                                            <p:cond delay="0"/>
+                                          </p:stCondLst>
+                                        </p:cTn>
+                                        <p:tgtEl>
+                                          <p:spTgt spid="3">
+                                            <p:txEl>
+                                              <p:pRg st="9" end="9"/>
+                                            </p:txEl>
+                                          </p:spTgt>
+                                        </p:tgtEl>
+                                        <p:attrNameLst>
+                                          <p:attrName>style.visibility</p:attrName>
+                                        </p:attrNameLst>
+                                      </p:cBhvr>
+                                      <p:to>
+                                        <p:strVal val="visible"/>
+                                      </p:to>
+                                    </p:set>
+                                    <p:animEffect transition="in" filter="fade">
+                                      <p:cBhvr>
+                                        <p:cTn id="42" dur="500"/>
+                                        <p:tgtEl>
+                                          <p:spTgt spid="3">
+                                            <p:txEl>
+                                              <p:pRg st="9" end="9"/>
+                                            </p:txEl>
+                                          </p:spTgt>
+                                        </p:tgtEl>
+                                      </p:cBhvr>
+                                    </p:animEffect>
+                                  </p:childTnLst>
+                                </p:cTn>
+                              </p:par>
+                            </p:childTnLst>
+                          </p:cTn>
+                        </p:par>
+                      </p:childTnLst>
+                    </p:cTn>
+                  </p:par>
+                </p:childTnLst>
+              </p:cTn>
+              <p:prevCondLst>
+                <p:cond evt="onPrev" delay="0">
+                  <p:tgtEl>
+                    <p:sldTgt/>
+                  </p:tgtEl>
+                </p:cond>
+              </p:prevCondLst>
+              <p:nextCondLst>
+                <p:cond evt="onNext" delay="0">
+                  <p:tgtEl>
+                    <p:sldTgt/>
+                  </p:tgtEl>
+                </p:cond>
+              </p:nextCondLst>
+            </p:seq>
+          </p:childTnLst>
+        </p:cTn>
+      </p:par>
+    </p:tnLst>
+    <p:bldLst>
+      <p:bldP spid="3" grpId="0" build="p"/>
+    </p:bldLst>
+  </p:timing>
+</p:sld>
+</file>
+
+<file path=ppt/slides/slide30.xml><?xml version="1.0" encoding="utf-8"?>
 <p:sld xmlns:a="http://schemas.openxmlformats.org/drawingml/2006/main" xmlns:r="http://schemas.openxmlformats.org/officeDocument/2006/relationships" xmlns:p="http://schemas.openxmlformats.org/presentationml/2006/main">
   <p:cSld>
     <p:spTree>
@@ -13154,802 +14389,7 @@
 </p:sld>
 </file>
 
-<file path=ppt/slides/slide3.xml><?xml version="1.0" encoding="utf-8"?>
-<p:sld xmlns:a="http://schemas.openxmlformats.org/drawingml/2006/main" xmlns:r="http://schemas.openxmlformats.org/officeDocument/2006/relationships" xmlns:p="http://schemas.openxmlformats.org/presentationml/2006/main">
-  <p:cSld>
-    <p:spTree>
-      <p:nvGrpSpPr>
-        <p:cNvPr id="1" name=""/>
-        <p:cNvGrpSpPr/>
-        <p:nvPr/>
-      </p:nvGrpSpPr>
-      <p:grpSpPr>
-        <a:xfrm>
-          <a:off x="0" y="0"/>
-          <a:ext cx="0" cy="0"/>
-          <a:chOff x="0" y="0"/>
-          <a:chExt cx="0" cy="0"/>
-        </a:xfrm>
-      </p:grpSpPr>
-      <p:sp>
-        <p:nvSpPr>
-          <p:cNvPr id="2" name="Titel 1"/>
-          <p:cNvSpPr>
-            <a:spLocks noGrp="1"/>
-          </p:cNvSpPr>
-          <p:nvPr>
-            <p:ph type="title"/>
-          </p:nvPr>
-        </p:nvSpPr>
-        <p:spPr/>
-        <p:txBody>
-          <a:bodyPr/>
-          <a:lstStyle/>
-          <a:p>
-            <a:r>
-              <a:rPr lang="de-AT" dirty="0"/>
-              <a:t>CSS </a:t>
-            </a:r>
-            <a:r>
-              <a:rPr lang="de-AT" dirty="0" err="1"/>
-              <a:t>Flexbox</a:t>
-            </a:r>
-            <a:endParaRPr lang="en-US" dirty="0"/>
-          </a:p>
-        </p:txBody>
-      </p:sp>
-      <p:sp>
-        <p:nvSpPr>
-          <p:cNvPr id="3" name="Inhaltsplatzhalter 2"/>
-          <p:cNvSpPr>
-            <a:spLocks noGrp="1"/>
-          </p:cNvSpPr>
-          <p:nvPr>
-            <p:ph idx="1"/>
-          </p:nvPr>
-        </p:nvSpPr>
-        <p:spPr>
-          <a:xfrm>
-            <a:off x="1181100" y="1869653"/>
-            <a:ext cx="5729969" cy="4988347"/>
-          </a:xfrm>
-        </p:spPr>
-        <p:txBody>
-          <a:bodyPr>
-            <a:normAutofit fontScale="92500" lnSpcReduction="20000"/>
-          </a:bodyPr>
-          <a:lstStyle/>
-          <a:p>
-            <a:r>
-              <a:rPr lang="de-DE" dirty="0"/>
-              <a:t>Das Modul für das flexible Box-Layout erleichtert die Gestaltung flexibler, reaktionsfähiger </a:t>
-            </a:r>
-            <a:r>
-              <a:rPr lang="de-DE" dirty="0" err="1"/>
-              <a:t>Layoutstrukturen</a:t>
-            </a:r>
-            <a:r>
-              <a:rPr lang="de-DE" dirty="0"/>
-              <a:t>.</a:t>
-            </a:r>
-          </a:p>
-          <a:p>
-            <a:r>
-              <a:rPr lang="de-DE" dirty="0"/>
-              <a:t>Anwendungsbereich eher bei </a:t>
-            </a:r>
-            <a:r>
-              <a:rPr lang="de-DE" b="1" dirty="0"/>
-              <a:t>1-dimensionale </a:t>
-            </a:r>
-            <a:r>
-              <a:rPr lang="de-DE" dirty="0"/>
-              <a:t>Strukturen</a:t>
-            </a:r>
-          </a:p>
-          <a:p>
-            <a:r>
-              <a:rPr lang="de-DE" dirty="0"/>
-              <a:t>Ein flexibles Layout muss ein übergeordnetes Element haben, bei dem die Eigenschaft "</a:t>
-            </a:r>
-            <a:r>
-              <a:rPr lang="de-DE" dirty="0" err="1"/>
-              <a:t>display</a:t>
-            </a:r>
-            <a:r>
-              <a:rPr lang="de-DE" dirty="0"/>
-              <a:t>" auf "</a:t>
-            </a:r>
-            <a:r>
-              <a:rPr lang="de-DE" dirty="0" err="1"/>
-              <a:t>flex</a:t>
-            </a:r>
-            <a:r>
-              <a:rPr lang="de-DE" dirty="0"/>
-              <a:t>" gesetzt ist.</a:t>
-            </a:r>
-          </a:p>
-          <a:p>
-            <a:r>
-              <a:rPr lang="de-DE" dirty="0"/>
-              <a:t>Die direkten Child-Elemente des flexiblen Containers werden automatisch zu flexiblen Elementen.</a:t>
-            </a:r>
-          </a:p>
-          <a:p>
-            <a:r>
-              <a:rPr lang="de-DE" dirty="0"/>
-              <a:t>Über weitere Flex-Eigenschaften kann das Layout genau definiert werden</a:t>
-            </a:r>
-          </a:p>
-          <a:p>
-            <a:pPr lvl="1"/>
-            <a:r>
-              <a:rPr lang="de-DE" dirty="0"/>
-              <a:t>Flex-</a:t>
-            </a:r>
-            <a:r>
-              <a:rPr lang="de-DE" dirty="0" err="1"/>
-              <a:t>direction</a:t>
-            </a:r>
-            <a:endParaRPr lang="de-DE" dirty="0"/>
-          </a:p>
-          <a:p>
-            <a:pPr lvl="1"/>
-            <a:r>
-              <a:rPr lang="de-DE" dirty="0" err="1"/>
-              <a:t>Align</a:t>
-            </a:r>
-            <a:r>
-              <a:rPr lang="de-DE" dirty="0"/>
-              <a:t>-items</a:t>
-            </a:r>
-          </a:p>
-          <a:p>
-            <a:pPr lvl="1"/>
-            <a:r>
-              <a:rPr lang="de-DE" dirty="0" err="1"/>
-              <a:t>Justify</a:t>
-            </a:r>
-            <a:r>
-              <a:rPr lang="de-DE" dirty="0"/>
-              <a:t>-content</a:t>
-            </a:r>
-          </a:p>
-          <a:p>
-            <a:pPr lvl="1"/>
-            <a:r>
-              <a:rPr lang="de-DE" dirty="0" err="1"/>
-              <a:t>Align</a:t>
-            </a:r>
-            <a:r>
-              <a:rPr lang="de-DE" dirty="0"/>
-              <a:t>-content</a:t>
-            </a:r>
-          </a:p>
-          <a:p>
-            <a:pPr lvl="1"/>
-            <a:r>
-              <a:rPr lang="de-DE" dirty="0"/>
-              <a:t>…</a:t>
-            </a:r>
-            <a:endParaRPr lang="en-US" dirty="0"/>
-          </a:p>
-        </p:txBody>
-      </p:sp>
-      <p:pic>
-        <p:nvPicPr>
-          <p:cNvPr id="6" name="Grafik 5"/>
-          <p:cNvPicPr>
-            <a:picLocks noChangeAspect="1"/>
-          </p:cNvPicPr>
-          <p:nvPr/>
-        </p:nvPicPr>
-        <p:blipFill rotWithShape="1">
-          <a:blip r:embed="rId2"/>
-          <a:srcRect t="1450"/>
-          <a:stretch/>
-        </p:blipFill>
-        <p:spPr>
-          <a:xfrm>
-            <a:off x="7125684" y="2057400"/>
-            <a:ext cx="3642632" cy="2654706"/>
-          </a:xfrm>
-          <a:prstGeom prst="rect">
-            <a:avLst/>
-          </a:prstGeom>
-        </p:spPr>
-      </p:pic>
-      <p:pic>
-        <p:nvPicPr>
-          <p:cNvPr id="7" name="Grafik 6"/>
-          <p:cNvPicPr>
-            <a:picLocks noChangeAspect="1"/>
-          </p:cNvPicPr>
-          <p:nvPr/>
-        </p:nvPicPr>
-        <p:blipFill>
-          <a:blip r:embed="rId3"/>
-          <a:stretch>
-            <a:fillRect/>
-          </a:stretch>
-        </p:blipFill>
-        <p:spPr>
-          <a:xfrm>
-            <a:off x="7231516" y="5161085"/>
-            <a:ext cx="4289008" cy="1327335"/>
-          </a:xfrm>
-          <a:prstGeom prst="rect">
-            <a:avLst/>
-          </a:prstGeom>
-        </p:spPr>
-      </p:pic>
-    </p:spTree>
-    <p:extLst>
-      <p:ext uri="{BB962C8B-B14F-4D97-AF65-F5344CB8AC3E}">
-        <p14:creationId xmlns:p14="http://schemas.microsoft.com/office/powerpoint/2010/main" val="932580139"/>
-      </p:ext>
-    </p:extLst>
-  </p:cSld>
-  <p:clrMapOvr>
-    <a:masterClrMapping/>
-  </p:clrMapOvr>
-  <p:timing>
-    <p:tnLst>
-      <p:par>
-        <p:cTn id="1" dur="indefinite" restart="never" nodeType="tmRoot">
-          <p:childTnLst>
-            <p:seq concurrent="1" nextAc="seek">
-              <p:cTn id="2" dur="indefinite" nodeType="mainSeq">
-                <p:childTnLst>
-                  <p:par>
-                    <p:cTn id="3" fill="hold">
-                      <p:stCondLst>
-                        <p:cond delay="indefinite"/>
-                      </p:stCondLst>
-                      <p:childTnLst>
-                        <p:par>
-                          <p:cTn id="4" fill="hold">
-                            <p:stCondLst>
-                              <p:cond delay="0"/>
-                            </p:stCondLst>
-                            <p:childTnLst>
-                              <p:par>
-                                <p:cTn id="5" presetID="10" presetClass="entr" presetSubtype="0" fill="hold" grpId="0" nodeType="clickEffect">
-                                  <p:stCondLst>
-                                    <p:cond delay="0"/>
-                                  </p:stCondLst>
-                                  <p:childTnLst>
-                                    <p:set>
-                                      <p:cBhvr>
-                                        <p:cTn id="6" dur="1" fill="hold">
-                                          <p:stCondLst>
-                                            <p:cond delay="0"/>
-                                          </p:stCondLst>
-                                        </p:cTn>
-                                        <p:tgtEl>
-                                          <p:spTgt spid="3">
-                                            <p:txEl>
-                                              <p:pRg st="0" end="0"/>
-                                            </p:txEl>
-                                          </p:spTgt>
-                                        </p:tgtEl>
-                                        <p:attrNameLst>
-                                          <p:attrName>style.visibility</p:attrName>
-                                        </p:attrNameLst>
-                                      </p:cBhvr>
-                                      <p:to>
-                                        <p:strVal val="visible"/>
-                                      </p:to>
-                                    </p:set>
-                                    <p:animEffect transition="in" filter="fade">
-                                      <p:cBhvr>
-                                        <p:cTn id="7" dur="500"/>
-                                        <p:tgtEl>
-                                          <p:spTgt spid="3">
-                                            <p:txEl>
-                                              <p:pRg st="0" end="0"/>
-                                            </p:txEl>
-                                          </p:spTgt>
-                                        </p:tgtEl>
-                                      </p:cBhvr>
-                                    </p:animEffect>
-                                  </p:childTnLst>
-                                </p:cTn>
-                              </p:par>
-                            </p:childTnLst>
-                          </p:cTn>
-                        </p:par>
-                      </p:childTnLst>
-                    </p:cTn>
-                  </p:par>
-                  <p:par>
-                    <p:cTn id="8" fill="hold">
-                      <p:stCondLst>
-                        <p:cond delay="indefinite"/>
-                      </p:stCondLst>
-                      <p:childTnLst>
-                        <p:par>
-                          <p:cTn id="9" fill="hold">
-                            <p:stCondLst>
-                              <p:cond delay="0"/>
-                            </p:stCondLst>
-                            <p:childTnLst>
-                              <p:par>
-                                <p:cTn id="10" presetID="10" presetClass="entr" presetSubtype="0" fill="hold" grpId="0" nodeType="clickEffect">
-                                  <p:stCondLst>
-                                    <p:cond delay="0"/>
-                                  </p:stCondLst>
-                                  <p:childTnLst>
-                                    <p:set>
-                                      <p:cBhvr>
-                                        <p:cTn id="11" dur="1" fill="hold">
-                                          <p:stCondLst>
-                                            <p:cond delay="0"/>
-                                          </p:stCondLst>
-                                        </p:cTn>
-                                        <p:tgtEl>
-                                          <p:spTgt spid="3">
-                                            <p:txEl>
-                                              <p:pRg st="1" end="1"/>
-                                            </p:txEl>
-                                          </p:spTgt>
-                                        </p:tgtEl>
-                                        <p:attrNameLst>
-                                          <p:attrName>style.visibility</p:attrName>
-                                        </p:attrNameLst>
-                                      </p:cBhvr>
-                                      <p:to>
-                                        <p:strVal val="visible"/>
-                                      </p:to>
-                                    </p:set>
-                                    <p:animEffect transition="in" filter="fade">
-                                      <p:cBhvr>
-                                        <p:cTn id="12" dur="500"/>
-                                        <p:tgtEl>
-                                          <p:spTgt spid="3">
-                                            <p:txEl>
-                                              <p:pRg st="1" end="1"/>
-                                            </p:txEl>
-                                          </p:spTgt>
-                                        </p:tgtEl>
-                                      </p:cBhvr>
-                                    </p:animEffect>
-                                  </p:childTnLst>
-                                </p:cTn>
-                              </p:par>
-                            </p:childTnLst>
-                          </p:cTn>
-                        </p:par>
-                      </p:childTnLst>
-                    </p:cTn>
-                  </p:par>
-                  <p:par>
-                    <p:cTn id="13" fill="hold">
-                      <p:stCondLst>
-                        <p:cond delay="indefinite"/>
-                      </p:stCondLst>
-                      <p:childTnLst>
-                        <p:par>
-                          <p:cTn id="14" fill="hold">
-                            <p:stCondLst>
-                              <p:cond delay="0"/>
-                            </p:stCondLst>
-                            <p:childTnLst>
-                              <p:par>
-                                <p:cTn id="15" presetID="10" presetClass="entr" presetSubtype="0" fill="hold" grpId="0" nodeType="clickEffect">
-                                  <p:stCondLst>
-                                    <p:cond delay="0"/>
-                                  </p:stCondLst>
-                                  <p:childTnLst>
-                                    <p:set>
-                                      <p:cBhvr>
-                                        <p:cTn id="16" dur="1" fill="hold">
-                                          <p:stCondLst>
-                                            <p:cond delay="0"/>
-                                          </p:stCondLst>
-                                        </p:cTn>
-                                        <p:tgtEl>
-                                          <p:spTgt spid="3">
-                                            <p:txEl>
-                                              <p:pRg st="2" end="2"/>
-                                            </p:txEl>
-                                          </p:spTgt>
-                                        </p:tgtEl>
-                                        <p:attrNameLst>
-                                          <p:attrName>style.visibility</p:attrName>
-                                        </p:attrNameLst>
-                                      </p:cBhvr>
-                                      <p:to>
-                                        <p:strVal val="visible"/>
-                                      </p:to>
-                                    </p:set>
-                                    <p:animEffect transition="in" filter="fade">
-                                      <p:cBhvr>
-                                        <p:cTn id="17" dur="500"/>
-                                        <p:tgtEl>
-                                          <p:spTgt spid="3">
-                                            <p:txEl>
-                                              <p:pRg st="2" end="2"/>
-                                            </p:txEl>
-                                          </p:spTgt>
-                                        </p:tgtEl>
-                                      </p:cBhvr>
-                                    </p:animEffect>
-                                  </p:childTnLst>
-                                </p:cTn>
-                              </p:par>
-                            </p:childTnLst>
-                          </p:cTn>
-                        </p:par>
-                      </p:childTnLst>
-                    </p:cTn>
-                  </p:par>
-                  <p:par>
-                    <p:cTn id="18" fill="hold">
-                      <p:stCondLst>
-                        <p:cond delay="indefinite"/>
-                      </p:stCondLst>
-                      <p:childTnLst>
-                        <p:par>
-                          <p:cTn id="19" fill="hold">
-                            <p:stCondLst>
-                              <p:cond delay="0"/>
-                            </p:stCondLst>
-                            <p:childTnLst>
-                              <p:par>
-                                <p:cTn id="20" presetID="10" presetClass="entr" presetSubtype="0" fill="hold" grpId="0" nodeType="clickEffect">
-                                  <p:stCondLst>
-                                    <p:cond delay="0"/>
-                                  </p:stCondLst>
-                                  <p:childTnLst>
-                                    <p:set>
-                                      <p:cBhvr>
-                                        <p:cTn id="21" dur="1" fill="hold">
-                                          <p:stCondLst>
-                                            <p:cond delay="0"/>
-                                          </p:stCondLst>
-                                        </p:cTn>
-                                        <p:tgtEl>
-                                          <p:spTgt spid="3">
-                                            <p:txEl>
-                                              <p:pRg st="3" end="3"/>
-                                            </p:txEl>
-                                          </p:spTgt>
-                                        </p:tgtEl>
-                                        <p:attrNameLst>
-                                          <p:attrName>style.visibility</p:attrName>
-                                        </p:attrNameLst>
-                                      </p:cBhvr>
-                                      <p:to>
-                                        <p:strVal val="visible"/>
-                                      </p:to>
-                                    </p:set>
-                                    <p:animEffect transition="in" filter="fade">
-                                      <p:cBhvr>
-                                        <p:cTn id="22" dur="500"/>
-                                        <p:tgtEl>
-                                          <p:spTgt spid="3">
-                                            <p:txEl>
-                                              <p:pRg st="3" end="3"/>
-                                            </p:txEl>
-                                          </p:spTgt>
-                                        </p:tgtEl>
-                                      </p:cBhvr>
-                                    </p:animEffect>
-                                  </p:childTnLst>
-                                </p:cTn>
-                              </p:par>
-                            </p:childTnLst>
-                          </p:cTn>
-                        </p:par>
-                      </p:childTnLst>
-                    </p:cTn>
-                  </p:par>
-                  <p:par>
-                    <p:cTn id="23" fill="hold">
-                      <p:stCondLst>
-                        <p:cond delay="indefinite"/>
-                      </p:stCondLst>
-                      <p:childTnLst>
-                        <p:par>
-                          <p:cTn id="24" fill="hold">
-                            <p:stCondLst>
-                              <p:cond delay="0"/>
-                            </p:stCondLst>
-                            <p:childTnLst>
-                              <p:par>
-                                <p:cTn id="25" presetID="10" presetClass="entr" presetSubtype="0" fill="hold" grpId="0" nodeType="clickEffect">
-                                  <p:stCondLst>
-                                    <p:cond delay="0"/>
-                                  </p:stCondLst>
-                                  <p:childTnLst>
-                                    <p:set>
-                                      <p:cBhvr>
-                                        <p:cTn id="26" dur="1" fill="hold">
-                                          <p:stCondLst>
-                                            <p:cond delay="0"/>
-                                          </p:stCondLst>
-                                        </p:cTn>
-                                        <p:tgtEl>
-                                          <p:spTgt spid="3">
-                                            <p:txEl>
-                                              <p:pRg st="4" end="4"/>
-                                            </p:txEl>
-                                          </p:spTgt>
-                                        </p:tgtEl>
-                                        <p:attrNameLst>
-                                          <p:attrName>style.visibility</p:attrName>
-                                        </p:attrNameLst>
-                                      </p:cBhvr>
-                                      <p:to>
-                                        <p:strVal val="visible"/>
-                                      </p:to>
-                                    </p:set>
-                                    <p:animEffect transition="in" filter="fade">
-                                      <p:cBhvr>
-                                        <p:cTn id="27" dur="500"/>
-                                        <p:tgtEl>
-                                          <p:spTgt spid="3">
-                                            <p:txEl>
-                                              <p:pRg st="4" end="4"/>
-                                            </p:txEl>
-                                          </p:spTgt>
-                                        </p:tgtEl>
-                                      </p:cBhvr>
-                                    </p:animEffect>
-                                  </p:childTnLst>
-                                </p:cTn>
-                              </p:par>
-                              <p:par>
-                                <p:cTn id="28" presetID="10" presetClass="entr" presetSubtype="0" fill="hold" grpId="0" nodeType="withEffect">
-                                  <p:stCondLst>
-                                    <p:cond delay="0"/>
-                                  </p:stCondLst>
-                                  <p:childTnLst>
-                                    <p:set>
-                                      <p:cBhvr>
-                                        <p:cTn id="29" dur="1" fill="hold">
-                                          <p:stCondLst>
-                                            <p:cond delay="0"/>
-                                          </p:stCondLst>
-                                        </p:cTn>
-                                        <p:tgtEl>
-                                          <p:spTgt spid="3">
-                                            <p:txEl>
-                                              <p:pRg st="5" end="5"/>
-                                            </p:txEl>
-                                          </p:spTgt>
-                                        </p:tgtEl>
-                                        <p:attrNameLst>
-                                          <p:attrName>style.visibility</p:attrName>
-                                        </p:attrNameLst>
-                                      </p:cBhvr>
-                                      <p:to>
-                                        <p:strVal val="visible"/>
-                                      </p:to>
-                                    </p:set>
-                                    <p:animEffect transition="in" filter="fade">
-                                      <p:cBhvr>
-                                        <p:cTn id="30" dur="500"/>
-                                        <p:tgtEl>
-                                          <p:spTgt spid="3">
-                                            <p:txEl>
-                                              <p:pRg st="5" end="5"/>
-                                            </p:txEl>
-                                          </p:spTgt>
-                                        </p:tgtEl>
-                                      </p:cBhvr>
-                                    </p:animEffect>
-                                  </p:childTnLst>
-                                </p:cTn>
-                              </p:par>
-                              <p:par>
-                                <p:cTn id="31" presetID="10" presetClass="entr" presetSubtype="0" fill="hold" grpId="0" nodeType="withEffect">
-                                  <p:stCondLst>
-                                    <p:cond delay="0"/>
-                                  </p:stCondLst>
-                                  <p:childTnLst>
-                                    <p:set>
-                                      <p:cBhvr>
-                                        <p:cTn id="32" dur="1" fill="hold">
-                                          <p:stCondLst>
-                                            <p:cond delay="0"/>
-                                          </p:stCondLst>
-                                        </p:cTn>
-                                        <p:tgtEl>
-                                          <p:spTgt spid="3">
-                                            <p:txEl>
-                                              <p:pRg st="6" end="6"/>
-                                            </p:txEl>
-                                          </p:spTgt>
-                                        </p:tgtEl>
-                                        <p:attrNameLst>
-                                          <p:attrName>style.visibility</p:attrName>
-                                        </p:attrNameLst>
-                                      </p:cBhvr>
-                                      <p:to>
-                                        <p:strVal val="visible"/>
-                                      </p:to>
-                                    </p:set>
-                                    <p:animEffect transition="in" filter="fade">
-                                      <p:cBhvr>
-                                        <p:cTn id="33" dur="500"/>
-                                        <p:tgtEl>
-                                          <p:spTgt spid="3">
-                                            <p:txEl>
-                                              <p:pRg st="6" end="6"/>
-                                            </p:txEl>
-                                          </p:spTgt>
-                                        </p:tgtEl>
-                                      </p:cBhvr>
-                                    </p:animEffect>
-                                  </p:childTnLst>
-                                </p:cTn>
-                              </p:par>
-                              <p:par>
-                                <p:cTn id="34" presetID="10" presetClass="entr" presetSubtype="0" fill="hold" grpId="0" nodeType="withEffect">
-                                  <p:stCondLst>
-                                    <p:cond delay="0"/>
-                                  </p:stCondLst>
-                                  <p:childTnLst>
-                                    <p:set>
-                                      <p:cBhvr>
-                                        <p:cTn id="35" dur="1" fill="hold">
-                                          <p:stCondLst>
-                                            <p:cond delay="0"/>
-                                          </p:stCondLst>
-                                        </p:cTn>
-                                        <p:tgtEl>
-                                          <p:spTgt spid="3">
-                                            <p:txEl>
-                                              <p:pRg st="7" end="7"/>
-                                            </p:txEl>
-                                          </p:spTgt>
-                                        </p:tgtEl>
-                                        <p:attrNameLst>
-                                          <p:attrName>style.visibility</p:attrName>
-                                        </p:attrNameLst>
-                                      </p:cBhvr>
-                                      <p:to>
-                                        <p:strVal val="visible"/>
-                                      </p:to>
-                                    </p:set>
-                                    <p:animEffect transition="in" filter="fade">
-                                      <p:cBhvr>
-                                        <p:cTn id="36" dur="500"/>
-                                        <p:tgtEl>
-                                          <p:spTgt spid="3">
-                                            <p:txEl>
-                                              <p:pRg st="7" end="7"/>
-                                            </p:txEl>
-                                          </p:spTgt>
-                                        </p:tgtEl>
-                                      </p:cBhvr>
-                                    </p:animEffect>
-                                  </p:childTnLst>
-                                </p:cTn>
-                              </p:par>
-                              <p:par>
-                                <p:cTn id="37" presetID="10" presetClass="entr" presetSubtype="0" fill="hold" grpId="0" nodeType="withEffect">
-                                  <p:stCondLst>
-                                    <p:cond delay="0"/>
-                                  </p:stCondLst>
-                                  <p:childTnLst>
-                                    <p:set>
-                                      <p:cBhvr>
-                                        <p:cTn id="38" dur="1" fill="hold">
-                                          <p:stCondLst>
-                                            <p:cond delay="0"/>
-                                          </p:stCondLst>
-                                        </p:cTn>
-                                        <p:tgtEl>
-                                          <p:spTgt spid="3">
-                                            <p:txEl>
-                                              <p:pRg st="8" end="8"/>
-                                            </p:txEl>
-                                          </p:spTgt>
-                                        </p:tgtEl>
-                                        <p:attrNameLst>
-                                          <p:attrName>style.visibility</p:attrName>
-                                        </p:attrNameLst>
-                                      </p:cBhvr>
-                                      <p:to>
-                                        <p:strVal val="visible"/>
-                                      </p:to>
-                                    </p:set>
-                                    <p:animEffect transition="in" filter="fade">
-                                      <p:cBhvr>
-                                        <p:cTn id="39" dur="500"/>
-                                        <p:tgtEl>
-                                          <p:spTgt spid="3">
-                                            <p:txEl>
-                                              <p:pRg st="8" end="8"/>
-                                            </p:txEl>
-                                          </p:spTgt>
-                                        </p:tgtEl>
-                                      </p:cBhvr>
-                                    </p:animEffect>
-                                  </p:childTnLst>
-                                </p:cTn>
-                              </p:par>
-                              <p:par>
-                                <p:cTn id="40" presetID="10" presetClass="entr" presetSubtype="0" fill="hold" grpId="0" nodeType="withEffect">
-                                  <p:stCondLst>
-                                    <p:cond delay="0"/>
-                                  </p:stCondLst>
-                                  <p:childTnLst>
-                                    <p:set>
-                                      <p:cBhvr>
-                                        <p:cTn id="41" dur="1" fill="hold">
-                                          <p:stCondLst>
-                                            <p:cond delay="0"/>
-                                          </p:stCondLst>
-                                        </p:cTn>
-                                        <p:tgtEl>
-                                          <p:spTgt spid="3">
-                                            <p:txEl>
-                                              <p:pRg st="9" end="9"/>
-                                            </p:txEl>
-                                          </p:spTgt>
-                                        </p:tgtEl>
-                                        <p:attrNameLst>
-                                          <p:attrName>style.visibility</p:attrName>
-                                        </p:attrNameLst>
-                                      </p:cBhvr>
-                                      <p:to>
-                                        <p:strVal val="visible"/>
-                                      </p:to>
-                                    </p:set>
-                                    <p:animEffect transition="in" filter="fade">
-                                      <p:cBhvr>
-                                        <p:cTn id="42" dur="500"/>
-                                        <p:tgtEl>
-                                          <p:spTgt spid="3">
-                                            <p:txEl>
-                                              <p:pRg st="9" end="9"/>
-                                            </p:txEl>
-                                          </p:spTgt>
-                                        </p:tgtEl>
-                                      </p:cBhvr>
-                                    </p:animEffect>
-                                  </p:childTnLst>
-                                </p:cTn>
-                              </p:par>
-                            </p:childTnLst>
-                          </p:cTn>
-                        </p:par>
-                      </p:childTnLst>
-                    </p:cTn>
-                  </p:par>
-                </p:childTnLst>
-              </p:cTn>
-              <p:prevCondLst>
-                <p:cond evt="onPrev" delay="0">
-                  <p:tgtEl>
-                    <p:sldTgt/>
-                  </p:tgtEl>
-                </p:cond>
-              </p:prevCondLst>
-              <p:nextCondLst>
-                <p:cond evt="onNext" delay="0">
-                  <p:tgtEl>
-                    <p:sldTgt/>
-                  </p:tgtEl>
-                </p:cond>
-              </p:nextCondLst>
-            </p:seq>
-          </p:childTnLst>
-        </p:cTn>
-      </p:par>
-    </p:tnLst>
-    <p:bldLst>
-      <p:bldP spid="3" grpId="0" build="p"/>
-    </p:bldLst>
-  </p:timing>
-</p:sld>
-</file>
-
-<file path=ppt/slides/slide30.xml><?xml version="1.0" encoding="utf-8"?>
+<file path=ppt/slides/slide31.xml><?xml version="1.0" encoding="utf-8"?>
 <p:sld xmlns:a="http://schemas.openxmlformats.org/drawingml/2006/main" xmlns:r="http://schemas.openxmlformats.org/officeDocument/2006/relationships" xmlns:p="http://schemas.openxmlformats.org/presentationml/2006/main">
   <p:cSld>
     <p:spTree>
@@ -14451,7 +14891,7 @@
 </p:sld>
 </file>
 
-<file path=ppt/slides/slide31.xml><?xml version="1.0" encoding="utf-8"?>
+<file path=ppt/slides/slide32.xml><?xml version="1.0" encoding="utf-8"?>
 <p:sld xmlns:a="http://schemas.openxmlformats.org/drawingml/2006/main" xmlns:r="http://schemas.openxmlformats.org/officeDocument/2006/relationships" xmlns:p="http://schemas.openxmlformats.org/presentationml/2006/main">
   <p:cSld>
     <p:spTree>
@@ -14575,7 +15015,7 @@
 </p:sld>
 </file>
 
-<file path=ppt/slides/slide32.xml><?xml version="1.0" encoding="utf-8"?>
+<file path=ppt/slides/slide33.xml><?xml version="1.0" encoding="utf-8"?>
 <p:sld xmlns:a="http://schemas.openxmlformats.org/drawingml/2006/main" xmlns:r="http://schemas.openxmlformats.org/officeDocument/2006/relationships" xmlns:p="http://schemas.openxmlformats.org/presentationml/2006/main">
   <p:cSld>
     <p:spTree>

</xml_diff>